<commit_message>
Presque arrivé à la fin
</commit_message>
<xml_diff>
--- a/Présentation/Mesure des défauts de l'oeil v2.pptx
+++ b/Présentation/Mesure des défauts de l'oeil v2.pptx
@@ -13,18 +13,17 @@
     <p:sldId id="257" r:id="rId7"/>
     <p:sldId id="260" r:id="rId8"/>
     <p:sldId id="262" r:id="rId9"/>
-    <p:sldId id="274" r:id="rId10"/>
+    <p:sldId id="278" r:id="rId10"/>
     <p:sldId id="263" r:id="rId11"/>
-    <p:sldId id="264" r:id="rId12"/>
-    <p:sldId id="275" r:id="rId13"/>
-    <p:sldId id="265" r:id="rId14"/>
-    <p:sldId id="270" r:id="rId15"/>
-    <p:sldId id="267" r:id="rId16"/>
-    <p:sldId id="269" r:id="rId17"/>
-    <p:sldId id="271" r:id="rId18"/>
-    <p:sldId id="268" r:id="rId19"/>
-    <p:sldId id="272" r:id="rId20"/>
-    <p:sldId id="276" r:id="rId21"/>
+    <p:sldId id="275" r:id="rId12"/>
+    <p:sldId id="265" r:id="rId13"/>
+    <p:sldId id="270" r:id="rId14"/>
+    <p:sldId id="267" r:id="rId15"/>
+    <p:sldId id="269" r:id="rId16"/>
+    <p:sldId id="271" r:id="rId17"/>
+    <p:sldId id="268" r:id="rId18"/>
+    <p:sldId id="272" r:id="rId19"/>
+    <p:sldId id="276" r:id="rId20"/>
   </p:sldIdLst>
   <p:sldSz cx="12192000" cy="6858000"/>
   <p:notesSz cx="6858000" cy="9144000"/>
@@ -995,9 +994,9 @@
           <a:p>
             <a:fld id="{D41B66AD-13D6-4B55-96E7-09AC117821E0}" type="datetimeFigureOut">
               <a:rPr lang="fr-FR" smtClean="0"/>
-              <a:t>23/05/2022</a:t>
+              <a:t>24/05/2022</a:t>
             </a:fld>
-            <a:endParaRPr lang="fr-FR"/>
+            <a:endParaRPr lang="fr-FR" dirty="0"/>
           </a:p>
         </p:txBody>
       </p:sp>
@@ -1016,7 +1015,7 @@
           <a:bodyPr/>
           <a:lstStyle/>
           <a:p>
-            <a:endParaRPr lang="fr-FR"/>
+            <a:endParaRPr lang="fr-FR" dirty="0"/>
           </a:p>
         </p:txBody>
       </p:sp>
@@ -1039,7 +1038,7 @@
               <a:rPr lang="fr-FR" smtClean="0"/>
               <a:t>‹N°›</a:t>
             </a:fld>
-            <a:endParaRPr lang="fr-FR"/>
+            <a:endParaRPr lang="fr-FR" dirty="0"/>
           </a:p>
         </p:txBody>
       </p:sp>
@@ -1246,9 +1245,9 @@
           <a:p>
             <a:fld id="{D41B66AD-13D6-4B55-96E7-09AC117821E0}" type="datetimeFigureOut">
               <a:rPr lang="fr-FR" smtClean="0"/>
-              <a:t>23/05/2022</a:t>
+              <a:t>24/05/2022</a:t>
             </a:fld>
-            <a:endParaRPr lang="fr-FR"/>
+            <a:endParaRPr lang="fr-FR" dirty="0"/>
           </a:p>
         </p:txBody>
       </p:sp>
@@ -1267,7 +1266,7 @@
           <a:bodyPr/>
           <a:lstStyle/>
           <a:p>
-            <a:endParaRPr lang="fr-FR"/>
+            <a:endParaRPr lang="fr-FR" dirty="0"/>
           </a:p>
         </p:txBody>
       </p:sp>
@@ -1290,7 +1289,7 @@
               <a:rPr lang="fr-FR" smtClean="0"/>
               <a:t>‹N°›</a:t>
             </a:fld>
-            <a:endParaRPr lang="fr-FR"/>
+            <a:endParaRPr lang="fr-FR" dirty="0"/>
           </a:p>
         </p:txBody>
       </p:sp>
@@ -1560,9 +1559,9 @@
           <a:p>
             <a:fld id="{D41B66AD-13D6-4B55-96E7-09AC117821E0}" type="datetimeFigureOut">
               <a:rPr lang="fr-FR" smtClean="0"/>
-              <a:t>23/05/2022</a:t>
+              <a:t>24/05/2022</a:t>
             </a:fld>
-            <a:endParaRPr lang="fr-FR"/>
+            <a:endParaRPr lang="fr-FR" dirty="0"/>
           </a:p>
         </p:txBody>
       </p:sp>
@@ -1581,7 +1580,7 @@
           <a:bodyPr/>
           <a:lstStyle/>
           <a:p>
-            <a:endParaRPr lang="fr-FR"/>
+            <a:endParaRPr lang="fr-FR" dirty="0"/>
           </a:p>
         </p:txBody>
       </p:sp>
@@ -1604,7 +1603,7 @@
               <a:rPr lang="fr-FR" smtClean="0"/>
               <a:t>‹N°›</a:t>
             </a:fld>
-            <a:endParaRPr lang="fr-FR"/>
+            <a:endParaRPr lang="fr-FR" dirty="0"/>
           </a:p>
         </p:txBody>
       </p:sp>
@@ -1887,9 +1886,9 @@
           <a:p>
             <a:fld id="{D41B66AD-13D6-4B55-96E7-09AC117821E0}" type="datetimeFigureOut">
               <a:rPr lang="fr-FR" smtClean="0"/>
-              <a:t>23/05/2022</a:t>
+              <a:t>24/05/2022</a:t>
             </a:fld>
-            <a:endParaRPr lang="fr-FR"/>
+            <a:endParaRPr lang="fr-FR" dirty="0"/>
           </a:p>
         </p:txBody>
       </p:sp>
@@ -1908,7 +1907,7 @@
           <a:bodyPr/>
           <a:lstStyle/>
           <a:p>
-            <a:endParaRPr lang="fr-FR"/>
+            <a:endParaRPr lang="fr-FR" dirty="0"/>
           </a:p>
         </p:txBody>
       </p:sp>
@@ -1931,7 +1930,7 @@
               <a:rPr lang="fr-FR" smtClean="0"/>
               <a:t>‹N°›</a:t>
             </a:fld>
-            <a:endParaRPr lang="fr-FR"/>
+            <a:endParaRPr lang="fr-FR" dirty="0"/>
           </a:p>
         </p:txBody>
       </p:sp>
@@ -2201,9 +2200,9 @@
           <a:p>
             <a:fld id="{D41B66AD-13D6-4B55-96E7-09AC117821E0}" type="datetimeFigureOut">
               <a:rPr lang="fr-FR" smtClean="0"/>
-              <a:t>23/05/2022</a:t>
+              <a:t>24/05/2022</a:t>
             </a:fld>
-            <a:endParaRPr lang="fr-FR"/>
+            <a:endParaRPr lang="fr-FR" dirty="0"/>
           </a:p>
         </p:txBody>
       </p:sp>
@@ -2222,7 +2221,7 @@
           <a:bodyPr/>
           <a:lstStyle/>
           <a:p>
-            <a:endParaRPr lang="fr-FR"/>
+            <a:endParaRPr lang="fr-FR" dirty="0"/>
           </a:p>
         </p:txBody>
       </p:sp>
@@ -2245,7 +2244,7 @@
               <a:rPr lang="fr-FR" smtClean="0"/>
               <a:t>‹N°›</a:t>
             </a:fld>
-            <a:endParaRPr lang="fr-FR"/>
+            <a:endParaRPr lang="fr-FR" dirty="0"/>
           </a:p>
         </p:txBody>
       </p:sp>
@@ -2588,9 +2587,9 @@
           <a:p>
             <a:fld id="{D41B66AD-13D6-4B55-96E7-09AC117821E0}" type="datetimeFigureOut">
               <a:rPr lang="fr-FR" smtClean="0"/>
-              <a:t>23/05/2022</a:t>
+              <a:t>24/05/2022</a:t>
             </a:fld>
-            <a:endParaRPr lang="fr-FR"/>
+            <a:endParaRPr lang="fr-FR" dirty="0"/>
           </a:p>
         </p:txBody>
       </p:sp>
@@ -2609,7 +2608,7 @@
           <a:bodyPr/>
           <a:lstStyle/>
           <a:p>
-            <a:endParaRPr lang="fr-FR"/>
+            <a:endParaRPr lang="fr-FR" dirty="0"/>
           </a:p>
         </p:txBody>
       </p:sp>
@@ -2632,7 +2631,7 @@
               <a:rPr lang="fr-FR" smtClean="0"/>
               <a:t>‹N°›</a:t>
             </a:fld>
-            <a:endParaRPr lang="fr-FR"/>
+            <a:endParaRPr lang="fr-FR" dirty="0"/>
           </a:p>
         </p:txBody>
       </p:sp>
@@ -2758,9 +2757,9 @@
           <a:p>
             <a:fld id="{D41B66AD-13D6-4B55-96E7-09AC117821E0}" type="datetimeFigureOut">
               <a:rPr lang="fr-FR" smtClean="0"/>
-              <a:t>23/05/2022</a:t>
+              <a:t>24/05/2022</a:t>
             </a:fld>
-            <a:endParaRPr lang="fr-FR"/>
+            <a:endParaRPr lang="fr-FR" dirty="0"/>
           </a:p>
         </p:txBody>
       </p:sp>
@@ -2779,7 +2778,7 @@
           <a:bodyPr/>
           <a:lstStyle/>
           <a:p>
-            <a:endParaRPr lang="fr-FR"/>
+            <a:endParaRPr lang="fr-FR" dirty="0"/>
           </a:p>
         </p:txBody>
       </p:sp>
@@ -2802,7 +2801,7 @@
               <a:rPr lang="fr-FR" smtClean="0"/>
               <a:t>‹N°›</a:t>
             </a:fld>
-            <a:endParaRPr lang="fr-FR"/>
+            <a:endParaRPr lang="fr-FR" dirty="0"/>
           </a:p>
         </p:txBody>
       </p:sp>
@@ -2938,9 +2937,9 @@
           <a:p>
             <a:fld id="{D41B66AD-13D6-4B55-96E7-09AC117821E0}" type="datetimeFigureOut">
               <a:rPr lang="fr-FR" smtClean="0"/>
-              <a:t>23/05/2022</a:t>
+              <a:t>24/05/2022</a:t>
             </a:fld>
-            <a:endParaRPr lang="fr-FR"/>
+            <a:endParaRPr lang="fr-FR" dirty="0"/>
           </a:p>
         </p:txBody>
       </p:sp>
@@ -2959,7 +2958,7 @@
           <a:bodyPr/>
           <a:lstStyle/>
           <a:p>
-            <a:endParaRPr lang="fr-FR"/>
+            <a:endParaRPr lang="fr-FR" dirty="0"/>
           </a:p>
         </p:txBody>
       </p:sp>
@@ -2982,7 +2981,7 @@
               <a:rPr lang="fr-FR" smtClean="0"/>
               <a:t>‹N°›</a:t>
             </a:fld>
-            <a:endParaRPr lang="fr-FR"/>
+            <a:endParaRPr lang="fr-FR" dirty="0"/>
           </a:p>
         </p:txBody>
       </p:sp>
@@ -3114,9 +3113,9 @@
           <a:p>
             <a:fld id="{D41B66AD-13D6-4B55-96E7-09AC117821E0}" type="datetimeFigureOut">
               <a:rPr lang="fr-FR" smtClean="0"/>
-              <a:t>23/05/2022</a:t>
+              <a:t>24/05/2022</a:t>
             </a:fld>
-            <a:endParaRPr lang="fr-FR"/>
+            <a:endParaRPr lang="fr-FR" dirty="0"/>
           </a:p>
         </p:txBody>
       </p:sp>
@@ -3135,7 +3134,7 @@
           <a:bodyPr/>
           <a:lstStyle/>
           <a:p>
-            <a:endParaRPr lang="fr-FR"/>
+            <a:endParaRPr lang="fr-FR" dirty="0"/>
           </a:p>
         </p:txBody>
       </p:sp>
@@ -3158,7 +3157,7 @@
               <a:rPr lang="fr-FR" smtClean="0"/>
               <a:t>‹N°›</a:t>
             </a:fld>
-            <a:endParaRPr lang="fr-FR"/>
+            <a:endParaRPr lang="fr-FR" dirty="0"/>
           </a:p>
         </p:txBody>
       </p:sp>
@@ -3361,9 +3360,9 @@
           <a:p>
             <a:fld id="{D41B66AD-13D6-4B55-96E7-09AC117821E0}" type="datetimeFigureOut">
               <a:rPr lang="fr-FR" smtClean="0"/>
-              <a:t>23/05/2022</a:t>
+              <a:t>24/05/2022</a:t>
             </a:fld>
-            <a:endParaRPr lang="fr-FR"/>
+            <a:endParaRPr lang="fr-FR" dirty="0"/>
           </a:p>
         </p:txBody>
       </p:sp>
@@ -3382,7 +3381,7 @@
           <a:bodyPr/>
           <a:lstStyle/>
           <a:p>
-            <a:endParaRPr lang="fr-FR"/>
+            <a:endParaRPr lang="fr-FR" dirty="0"/>
           </a:p>
         </p:txBody>
       </p:sp>
@@ -3405,7 +3404,7 @@
               <a:rPr lang="fr-FR" smtClean="0"/>
               <a:t>‹N°›</a:t>
             </a:fld>
-            <a:endParaRPr lang="fr-FR"/>
+            <a:endParaRPr lang="fr-FR" dirty="0"/>
           </a:p>
         </p:txBody>
       </p:sp>
@@ -3593,9 +3592,9 @@
           <a:p>
             <a:fld id="{D41B66AD-13D6-4B55-96E7-09AC117821E0}" type="datetimeFigureOut">
               <a:rPr lang="fr-FR" smtClean="0"/>
-              <a:t>23/05/2022</a:t>
+              <a:t>24/05/2022</a:t>
             </a:fld>
-            <a:endParaRPr lang="fr-FR"/>
+            <a:endParaRPr lang="fr-FR" dirty="0"/>
           </a:p>
         </p:txBody>
       </p:sp>
@@ -3614,7 +3613,7 @@
           <a:bodyPr/>
           <a:lstStyle/>
           <a:p>
-            <a:endParaRPr lang="fr-FR"/>
+            <a:endParaRPr lang="fr-FR" dirty="0"/>
           </a:p>
         </p:txBody>
       </p:sp>
@@ -3637,7 +3636,7 @@
               <a:rPr lang="fr-FR" smtClean="0"/>
               <a:t>‹N°›</a:t>
             </a:fld>
-            <a:endParaRPr lang="fr-FR"/>
+            <a:endParaRPr lang="fr-FR" dirty="0"/>
           </a:p>
         </p:txBody>
       </p:sp>
@@ -3967,9 +3966,9 @@
           <a:p>
             <a:fld id="{D41B66AD-13D6-4B55-96E7-09AC117821E0}" type="datetimeFigureOut">
               <a:rPr lang="fr-FR" smtClean="0"/>
-              <a:t>23/05/2022</a:t>
+              <a:t>24/05/2022</a:t>
             </a:fld>
-            <a:endParaRPr lang="fr-FR"/>
+            <a:endParaRPr lang="fr-FR" dirty="0"/>
           </a:p>
         </p:txBody>
       </p:sp>
@@ -3988,7 +3987,7 @@
           <a:bodyPr/>
           <a:lstStyle/>
           <a:p>
-            <a:endParaRPr lang="fr-FR"/>
+            <a:endParaRPr lang="fr-FR" dirty="0"/>
           </a:p>
         </p:txBody>
       </p:sp>
@@ -4011,7 +4010,7 @@
               <a:rPr lang="fr-FR" smtClean="0"/>
               <a:t>‹N°›</a:t>
             </a:fld>
-            <a:endParaRPr lang="fr-FR"/>
+            <a:endParaRPr lang="fr-FR" dirty="0"/>
           </a:p>
         </p:txBody>
       </p:sp>
@@ -4090,9 +4089,9 @@
           <a:p>
             <a:fld id="{D41B66AD-13D6-4B55-96E7-09AC117821E0}" type="datetimeFigureOut">
               <a:rPr lang="fr-FR" smtClean="0"/>
-              <a:t>23/05/2022</a:t>
+              <a:t>24/05/2022</a:t>
             </a:fld>
-            <a:endParaRPr lang="fr-FR"/>
+            <a:endParaRPr lang="fr-FR" dirty="0"/>
           </a:p>
         </p:txBody>
       </p:sp>
@@ -4111,7 +4110,7 @@
           <a:bodyPr/>
           <a:lstStyle/>
           <a:p>
-            <a:endParaRPr lang="fr-FR"/>
+            <a:endParaRPr lang="fr-FR" dirty="0"/>
           </a:p>
         </p:txBody>
       </p:sp>
@@ -4134,7 +4133,7 @@
               <a:rPr lang="fr-FR" smtClean="0"/>
               <a:t>‹N°›</a:t>
             </a:fld>
-            <a:endParaRPr lang="fr-FR"/>
+            <a:endParaRPr lang="fr-FR" dirty="0"/>
           </a:p>
         </p:txBody>
       </p:sp>
@@ -4185,9 +4184,9 @@
           <a:p>
             <a:fld id="{D41B66AD-13D6-4B55-96E7-09AC117821E0}" type="datetimeFigureOut">
               <a:rPr lang="fr-FR" smtClean="0"/>
-              <a:t>23/05/2022</a:t>
+              <a:t>24/05/2022</a:t>
             </a:fld>
-            <a:endParaRPr lang="fr-FR"/>
+            <a:endParaRPr lang="fr-FR" dirty="0"/>
           </a:p>
         </p:txBody>
       </p:sp>
@@ -4206,7 +4205,7 @@
           <a:bodyPr/>
           <a:lstStyle/>
           <a:p>
-            <a:endParaRPr lang="fr-FR"/>
+            <a:endParaRPr lang="fr-FR" dirty="0"/>
           </a:p>
         </p:txBody>
       </p:sp>
@@ -4229,7 +4228,7 @@
               <a:rPr lang="fr-FR" smtClean="0"/>
               <a:t>‹N°›</a:t>
             </a:fld>
-            <a:endParaRPr lang="fr-FR"/>
+            <a:endParaRPr lang="fr-FR" dirty="0"/>
           </a:p>
         </p:txBody>
       </p:sp>
@@ -4440,9 +4439,9 @@
           <a:p>
             <a:fld id="{D41B66AD-13D6-4B55-96E7-09AC117821E0}" type="datetimeFigureOut">
               <a:rPr lang="fr-FR" smtClean="0"/>
-              <a:t>23/05/2022</a:t>
+              <a:t>24/05/2022</a:t>
             </a:fld>
-            <a:endParaRPr lang="fr-FR"/>
+            <a:endParaRPr lang="fr-FR" dirty="0"/>
           </a:p>
         </p:txBody>
       </p:sp>
@@ -4461,7 +4460,7 @@
           <a:bodyPr/>
           <a:lstStyle/>
           <a:p>
-            <a:endParaRPr lang="fr-FR"/>
+            <a:endParaRPr lang="fr-FR" dirty="0"/>
           </a:p>
         </p:txBody>
       </p:sp>
@@ -4484,7 +4483,7 @@
               <a:rPr lang="fr-FR" smtClean="0"/>
               <a:t>‹N°›</a:t>
             </a:fld>
-            <a:endParaRPr lang="fr-FR"/>
+            <a:endParaRPr lang="fr-FR" dirty="0"/>
           </a:p>
         </p:txBody>
       </p:sp>
@@ -4612,7 +4611,7 @@
           </a:lstStyle>
           <a:p>
             <a:r>
-              <a:rPr lang="fr-FR"/>
+              <a:rPr lang="fr-FR" dirty="0"/>
               <a:t>Cliquez sur l'icône pour ajouter une image</a:t>
             </a:r>
             <a:endParaRPr lang="en-US" dirty="0"/>
@@ -4703,9 +4702,9 @@
           <a:p>
             <a:fld id="{D41B66AD-13D6-4B55-96E7-09AC117821E0}" type="datetimeFigureOut">
               <a:rPr lang="fr-FR" smtClean="0"/>
-              <a:t>23/05/2022</a:t>
+              <a:t>24/05/2022</a:t>
             </a:fld>
-            <a:endParaRPr lang="fr-FR"/>
+            <a:endParaRPr lang="fr-FR" dirty="0"/>
           </a:p>
         </p:txBody>
       </p:sp>
@@ -4724,7 +4723,7 @@
           <a:bodyPr/>
           <a:lstStyle/>
           <a:p>
-            <a:endParaRPr lang="fr-FR"/>
+            <a:endParaRPr lang="fr-FR" dirty="0"/>
           </a:p>
         </p:txBody>
       </p:sp>
@@ -4747,7 +4746,7 @@
               <a:rPr lang="fr-FR" smtClean="0"/>
               <a:t>‹N°›</a:t>
             </a:fld>
-            <a:endParaRPr lang="fr-FR"/>
+            <a:endParaRPr lang="fr-FR" dirty="0"/>
           </a:p>
         </p:txBody>
       </p:sp>
@@ -5448,9 +5447,9 @@
           <a:p>
             <a:fld id="{D41B66AD-13D6-4B55-96E7-09AC117821E0}" type="datetimeFigureOut">
               <a:rPr lang="fr-FR" smtClean="0"/>
-              <a:t>23/05/2022</a:t>
+              <a:t>24/05/2022</a:t>
             </a:fld>
-            <a:endParaRPr lang="fr-FR"/>
+            <a:endParaRPr lang="fr-FR" dirty="0"/>
           </a:p>
         </p:txBody>
       </p:sp>
@@ -5487,7 +5486,7 @@
             </a:lvl1pPr>
           </a:lstStyle>
           <a:p>
-            <a:endParaRPr lang="fr-FR"/>
+            <a:endParaRPr lang="fr-FR" dirty="0"/>
           </a:p>
         </p:txBody>
       </p:sp>
@@ -5526,7 +5525,7 @@
               <a:rPr lang="fr-FR" smtClean="0"/>
               <a:t>‹N°›</a:t>
             </a:fld>
-            <a:endParaRPr lang="fr-FR"/>
+            <a:endParaRPr lang="fr-FR" dirty="0"/>
           </a:p>
         </p:txBody>
       </p:sp>
@@ -6640,342 +6639,7 @@
             </a:r>
             <a:r>
               <a:rPr lang="fr-FR" sz="3600" dirty="0"/>
-              <a:t>Mesure de la déformation d’un front d’onde type </a:t>
-            </a:r>
-            <a:r>
-              <a:rPr lang="fr-FR" sz="3600" dirty="0" err="1"/>
-              <a:t>Shack</a:t>
-            </a:r>
-            <a:r>
-              <a:rPr lang="fr-FR" sz="3600" dirty="0"/>
-              <a:t>-Hartmann</a:t>
-            </a:r>
-            <a:endParaRPr lang="fr-FR" dirty="0"/>
-          </a:p>
-        </p:txBody>
-      </p:sp>
-      <p:pic>
-        <p:nvPicPr>
-          <p:cNvPr id="5122" name="Picture 2">
-            <a:extLst>
-              <a:ext uri="{FF2B5EF4-FFF2-40B4-BE49-F238E27FC236}">
-                <a16:creationId xmlns:a16="http://schemas.microsoft.com/office/drawing/2014/main" id="{BD846EA8-B6FA-480D-ADB8-64D9AEE0052A}"/>
-              </a:ext>
-            </a:extLst>
-          </p:cNvPr>
-          <p:cNvPicPr>
-            <a:picLocks noChangeAspect="1" noChangeArrowheads="1"/>
-          </p:cNvPicPr>
-          <p:nvPr/>
-        </p:nvPicPr>
-        <p:blipFill>
-          <a:blip r:embed="rId2">
-            <a:extLst>
-              <a:ext uri="{28A0092B-C50C-407E-A947-70E740481C1C}">
-                <a14:useLocalDpi xmlns:a14="http://schemas.microsoft.com/office/drawing/2010/main" val="0"/>
-              </a:ext>
-            </a:extLst>
-          </a:blip>
-          <a:srcRect/>
-          <a:stretch>
-            <a:fillRect/>
-          </a:stretch>
-        </p:blipFill>
-        <p:spPr bwMode="auto">
-          <a:xfrm>
-            <a:off x="677334" y="2433808"/>
-            <a:ext cx="3712723" cy="2796145"/>
-          </a:xfrm>
-          <a:prstGeom prst="rect">
-            <a:avLst/>
-          </a:prstGeom>
-          <a:noFill/>
-          <a:extLst>
-            <a:ext uri="{909E8E84-426E-40DD-AFC4-6F175D3DCCD1}">
-              <a14:hiddenFill xmlns:a14="http://schemas.microsoft.com/office/drawing/2010/main">
-                <a:solidFill>
-                  <a:srgbClr val="FFFFFF"/>
-                </a:solidFill>
-              </a14:hiddenFill>
-            </a:ext>
-          </a:extLst>
-        </p:spPr>
-      </p:pic>
-      <p:pic>
-        <p:nvPicPr>
-          <p:cNvPr id="5124" name="Picture 4">
-            <a:extLst>
-              <a:ext uri="{FF2B5EF4-FFF2-40B4-BE49-F238E27FC236}">
-                <a16:creationId xmlns:a16="http://schemas.microsoft.com/office/drawing/2014/main" id="{6E16F791-7F51-4997-9148-410C1DCDF900}"/>
-              </a:ext>
-            </a:extLst>
-          </p:cNvPr>
-          <p:cNvPicPr>
-            <a:picLocks noChangeAspect="1" noChangeArrowheads="1"/>
-          </p:cNvPicPr>
-          <p:nvPr/>
-        </p:nvPicPr>
-        <p:blipFill>
-          <a:blip r:embed="rId3">
-            <a:extLst>
-              <a:ext uri="{28A0092B-C50C-407E-A947-70E740481C1C}">
-                <a14:useLocalDpi xmlns:a14="http://schemas.microsoft.com/office/drawing/2010/main" val="0"/>
-              </a:ext>
-            </a:extLst>
-          </a:blip>
-          <a:srcRect/>
-          <a:stretch>
-            <a:fillRect/>
-          </a:stretch>
-        </p:blipFill>
-        <p:spPr bwMode="auto">
-          <a:xfrm>
-            <a:off x="4858937" y="2950814"/>
-            <a:ext cx="4216970" cy="1762135"/>
-          </a:xfrm>
-          <a:prstGeom prst="rect">
-            <a:avLst/>
-          </a:prstGeom>
-          <a:noFill/>
-          <a:extLst>
-            <a:ext uri="{909E8E84-426E-40DD-AFC4-6F175D3DCCD1}">
-              <a14:hiddenFill xmlns:a14="http://schemas.microsoft.com/office/drawing/2010/main">
-                <a:solidFill>
-                  <a:srgbClr val="FFFFFF"/>
-                </a:solidFill>
-              </a14:hiddenFill>
-            </a:ext>
-          </a:extLst>
-        </p:spPr>
-      </p:pic>
-      <p:sp>
-        <p:nvSpPr>
-          <p:cNvPr id="7" name="ZoneTexte 6">
-            <a:extLst>
-              <a:ext uri="{FF2B5EF4-FFF2-40B4-BE49-F238E27FC236}">
-                <a16:creationId xmlns:a16="http://schemas.microsoft.com/office/drawing/2014/main" id="{06C8B730-B79F-4879-89D9-36F122E34983}"/>
-              </a:ext>
-            </a:extLst>
-          </p:cNvPr>
-          <p:cNvSpPr txBox="1"/>
-          <p:nvPr/>
-        </p:nvSpPr>
-        <p:spPr>
-          <a:xfrm>
-            <a:off x="4460132" y="4755002"/>
-            <a:ext cx="2650787" cy="861774"/>
-          </a:xfrm>
-          <a:prstGeom prst="rect">
-            <a:avLst/>
-          </a:prstGeom>
-          <a:noFill/>
-        </p:spPr>
-        <p:txBody>
-          <a:bodyPr wrap="square">
-            <a:spAutoFit/>
-          </a:bodyPr>
-          <a:lstStyle/>
-          <a:p>
-            <a:pPr algn="ctr" rtl="0">
-              <a:spcBef>
-                <a:spcPts val="0"/>
-              </a:spcBef>
-              <a:spcAft>
-                <a:spcPts val="0"/>
-              </a:spcAft>
-            </a:pPr>
-            <a:r>
-              <a:rPr lang="fr-FR" sz="1400" b="0" i="0" u="none" strike="noStrike" dirty="0">
-                <a:solidFill>
-                  <a:srgbClr val="000000"/>
-                </a:solidFill>
-                <a:effectLst/>
-                <a:latin typeface="Roboto" panose="02000000000000000000" pitchFamily="2" charset="0"/>
-              </a:rPr>
-              <a:t>Positions idéales des points</a:t>
-            </a:r>
-            <a:endParaRPr lang="fr-FR" sz="1400" b="0" dirty="0">
-              <a:effectLst/>
-            </a:endParaRPr>
-          </a:p>
-          <a:p>
-            <a:br>
-              <a:rPr lang="fr-FR" dirty="0"/>
-            </a:br>
-            <a:endParaRPr lang="fr-FR" dirty="0"/>
-          </a:p>
-        </p:txBody>
-      </p:sp>
-      <p:sp>
-        <p:nvSpPr>
-          <p:cNvPr id="8" name="ZoneTexte 7">
-            <a:extLst>
-              <a:ext uri="{FF2B5EF4-FFF2-40B4-BE49-F238E27FC236}">
-                <a16:creationId xmlns:a16="http://schemas.microsoft.com/office/drawing/2014/main" id="{28F53D53-C429-4D53-94FC-85FBF400D6A2}"/>
-              </a:ext>
-            </a:extLst>
-          </p:cNvPr>
-          <p:cNvSpPr txBox="1"/>
-          <p:nvPr/>
-        </p:nvSpPr>
-        <p:spPr>
-          <a:xfrm>
-            <a:off x="6901746" y="4755002"/>
-            <a:ext cx="2650787" cy="861774"/>
-          </a:xfrm>
-          <a:prstGeom prst="rect">
-            <a:avLst/>
-          </a:prstGeom>
-          <a:noFill/>
-        </p:spPr>
-        <p:txBody>
-          <a:bodyPr wrap="square">
-            <a:spAutoFit/>
-          </a:bodyPr>
-          <a:lstStyle/>
-          <a:p>
-            <a:pPr algn="ctr" rtl="0">
-              <a:spcBef>
-                <a:spcPts val="0"/>
-              </a:spcBef>
-              <a:spcAft>
-                <a:spcPts val="0"/>
-              </a:spcAft>
-            </a:pPr>
-            <a:r>
-              <a:rPr lang="fr-FR" sz="1400" b="0" i="0" u="none" strike="noStrike" dirty="0">
-                <a:solidFill>
-                  <a:srgbClr val="000000"/>
-                </a:solidFill>
-                <a:effectLst/>
-                <a:latin typeface="Roboto" panose="02000000000000000000" pitchFamily="2" charset="0"/>
-              </a:rPr>
-              <a:t>Positions réelles des points</a:t>
-            </a:r>
-            <a:endParaRPr lang="fr-FR" sz="1400" b="0" dirty="0">
-              <a:effectLst/>
-            </a:endParaRPr>
-          </a:p>
-          <a:p>
-            <a:br>
-              <a:rPr lang="fr-FR" dirty="0"/>
-            </a:br>
-            <a:endParaRPr lang="fr-FR" dirty="0"/>
-          </a:p>
-        </p:txBody>
-      </p:sp>
-      <p:cxnSp>
-        <p:nvCxnSpPr>
-          <p:cNvPr id="4" name="Connecteur droit avec flèche 3">
-            <a:extLst>
-              <a:ext uri="{FF2B5EF4-FFF2-40B4-BE49-F238E27FC236}">
-                <a16:creationId xmlns:a16="http://schemas.microsoft.com/office/drawing/2014/main" id="{0D9AC02D-8B5B-469D-84C9-E8C4E5F70828}"/>
-              </a:ext>
-            </a:extLst>
-          </p:cNvPr>
-          <p:cNvCxnSpPr>
-            <a:cxnSpLocks/>
-          </p:cNvCxnSpPr>
-          <p:nvPr/>
-        </p:nvCxnSpPr>
-        <p:spPr>
-          <a:xfrm flipH="1">
-            <a:off x="1050587" y="3638145"/>
-            <a:ext cx="272375" cy="1206229"/>
-          </a:xfrm>
-          <a:prstGeom prst="straightConnector1">
-            <a:avLst/>
-          </a:prstGeom>
-          <a:ln>
-            <a:solidFill>
-              <a:srgbClr val="FF0000"/>
-            </a:solidFill>
-            <a:tailEnd type="triangle"/>
-          </a:ln>
-        </p:spPr>
-        <p:style>
-          <a:lnRef idx="2">
-            <a:schemeClr val="dk1"/>
-          </a:lnRef>
-          <a:fillRef idx="0">
-            <a:schemeClr val="dk1"/>
-          </a:fillRef>
-          <a:effectRef idx="1">
-            <a:schemeClr val="dk1"/>
-          </a:effectRef>
-          <a:fontRef idx="minor">
-            <a:schemeClr val="tx1"/>
-          </a:fontRef>
-        </p:style>
-      </p:cxnSp>
-    </p:spTree>
-    <p:extLst>
-      <p:ext uri="{BB962C8B-B14F-4D97-AF65-F5344CB8AC3E}">
-        <p14:creationId xmlns:p14="http://schemas.microsoft.com/office/powerpoint/2010/main" val="3393957318"/>
-      </p:ext>
-    </p:extLst>
-  </p:cSld>
-  <p:clrMapOvr>
-    <a:masterClrMapping/>
-  </p:clrMapOvr>
-</p:sld>
-</file>
-
-<file path=ppt/slides/slide12.xml><?xml version="1.0" encoding="utf-8"?>
-<p:sld xmlns:a="http://schemas.openxmlformats.org/drawingml/2006/main" xmlns:r="http://schemas.openxmlformats.org/officeDocument/2006/relationships" xmlns:p="http://schemas.openxmlformats.org/presentationml/2006/main">
-  <p:cSld>
-    <p:spTree>
-      <p:nvGrpSpPr>
-        <p:cNvPr id="1" name=""/>
-        <p:cNvGrpSpPr/>
-        <p:nvPr/>
-      </p:nvGrpSpPr>
-      <p:grpSpPr>
-        <a:xfrm>
-          <a:off x="0" y="0"/>
-          <a:ext cx="0" cy="0"/>
-          <a:chOff x="0" y="0"/>
-          <a:chExt cx="0" cy="0"/>
-        </a:xfrm>
-      </p:grpSpPr>
-      <p:sp>
-        <p:nvSpPr>
-          <p:cNvPr id="2" name="Titre 1">
-            <a:extLst>
-              <a:ext uri="{FF2B5EF4-FFF2-40B4-BE49-F238E27FC236}">
-                <a16:creationId xmlns:a16="http://schemas.microsoft.com/office/drawing/2014/main" id="{406A12DA-9A2D-4669-8BCC-6EF19F2F83DB}"/>
-              </a:ext>
-            </a:extLst>
-          </p:cNvPr>
-          <p:cNvSpPr>
-            <a:spLocks noGrp="1"/>
-          </p:cNvSpPr>
-          <p:nvPr>
-            <p:ph type="title"/>
-          </p:nvPr>
-        </p:nvSpPr>
-        <p:spPr/>
-        <p:txBody>
-          <a:bodyPr>
-            <a:normAutofit/>
-          </a:bodyPr>
-          <a:lstStyle/>
-          <a:p>
-            <a:r>
-              <a:rPr lang="fr-FR" dirty="0"/>
-              <a:t>II) </a:t>
-            </a:r>
-            <a:r>
-              <a:rPr lang="fr-FR" sz="3600" dirty="0"/>
-              <a:t>Mesure de la déformation d’un front d’onde type </a:t>
-            </a:r>
-            <a:r>
-              <a:rPr lang="fr-FR" sz="3600" dirty="0" err="1"/>
-              <a:t>Shack</a:t>
-            </a:r>
-            <a:r>
-              <a:rPr lang="fr-FR" sz="3600" dirty="0"/>
-              <a:t>-Hartmann</a:t>
+              <a:t>Mesure de la déformation d’un front d’onde type Shack-Hartmann</a:t>
             </a:r>
             <a:endParaRPr lang="fr-FR" dirty="0"/>
           </a:p>
@@ -7248,6 +6912,449 @@
 </p:sld>
 </file>
 
+<file path=ppt/slides/slide12.xml><?xml version="1.0" encoding="utf-8"?>
+<p:sld xmlns:a="http://schemas.openxmlformats.org/drawingml/2006/main" xmlns:r="http://schemas.openxmlformats.org/officeDocument/2006/relationships" xmlns:p="http://schemas.openxmlformats.org/presentationml/2006/main">
+  <p:cSld>
+    <p:spTree>
+      <p:nvGrpSpPr>
+        <p:cNvPr id="1" name=""/>
+        <p:cNvGrpSpPr/>
+        <p:nvPr/>
+      </p:nvGrpSpPr>
+      <p:grpSpPr>
+        <a:xfrm>
+          <a:off x="0" y="0"/>
+          <a:ext cx="0" cy="0"/>
+          <a:chOff x="0" y="0"/>
+          <a:chExt cx="0" cy="0"/>
+        </a:xfrm>
+      </p:grpSpPr>
+      <p:sp>
+        <p:nvSpPr>
+          <p:cNvPr id="2" name="Titre 1">
+            <a:extLst>
+              <a:ext uri="{FF2B5EF4-FFF2-40B4-BE49-F238E27FC236}">
+                <a16:creationId xmlns:a16="http://schemas.microsoft.com/office/drawing/2014/main" id="{AA72167C-A523-4ACA-8E54-6B6FC3BF1142}"/>
+              </a:ext>
+            </a:extLst>
+          </p:cNvPr>
+          <p:cNvSpPr>
+            <a:spLocks noGrp="1"/>
+          </p:cNvSpPr>
+          <p:nvPr>
+            <p:ph type="title"/>
+          </p:nvPr>
+        </p:nvSpPr>
+        <p:spPr/>
+        <p:txBody>
+          <a:bodyPr/>
+          <a:lstStyle/>
+          <a:p>
+            <a:r>
+              <a:rPr lang="fr-FR" dirty="0"/>
+              <a:t>L’expérience</a:t>
+            </a:r>
+          </a:p>
+        </p:txBody>
+      </p:sp>
+      <p:pic>
+        <p:nvPicPr>
+          <p:cNvPr id="6146" name="Picture 2">
+            <a:extLst>
+              <a:ext uri="{FF2B5EF4-FFF2-40B4-BE49-F238E27FC236}">
+                <a16:creationId xmlns:a16="http://schemas.microsoft.com/office/drawing/2014/main" id="{748C01D8-82C1-4242-A5D5-F80C32992C25}"/>
+              </a:ext>
+            </a:extLst>
+          </p:cNvPr>
+          <p:cNvPicPr>
+            <a:picLocks noChangeAspect="1" noChangeArrowheads="1"/>
+          </p:cNvPicPr>
+          <p:nvPr/>
+        </p:nvPicPr>
+        <p:blipFill rotWithShape="1">
+          <a:blip r:embed="rId2">
+            <a:extLst>
+              <a:ext uri="{28A0092B-C50C-407E-A947-70E740481C1C}">
+                <a14:useLocalDpi xmlns:a14="http://schemas.microsoft.com/office/drawing/2010/main" val="0"/>
+              </a:ext>
+            </a:extLst>
+          </a:blip>
+          <a:srcRect l="40856" t="18236" r="10919" b="48780"/>
+          <a:stretch/>
+        </p:blipFill>
+        <p:spPr bwMode="auto">
+          <a:xfrm>
+            <a:off x="677334" y="1930400"/>
+            <a:ext cx="3328067" cy="3035030"/>
+          </a:xfrm>
+          <a:prstGeom prst="rect">
+            <a:avLst/>
+          </a:prstGeom>
+          <a:noFill/>
+          <a:extLst>
+            <a:ext uri="{909E8E84-426E-40DD-AFC4-6F175D3DCCD1}">
+              <a14:hiddenFill xmlns:a14="http://schemas.microsoft.com/office/drawing/2010/main">
+                <a:solidFill>
+                  <a:srgbClr val="FFFFFF"/>
+                </a:solidFill>
+              </a14:hiddenFill>
+            </a:ext>
+          </a:extLst>
+        </p:spPr>
+      </p:pic>
+      <p:pic>
+        <p:nvPicPr>
+          <p:cNvPr id="6148" name="Picture 4">
+            <a:extLst>
+              <a:ext uri="{FF2B5EF4-FFF2-40B4-BE49-F238E27FC236}">
+                <a16:creationId xmlns:a16="http://schemas.microsoft.com/office/drawing/2014/main" id="{B80D4406-E771-4395-BE6E-D862D0723812}"/>
+              </a:ext>
+            </a:extLst>
+          </p:cNvPr>
+          <p:cNvPicPr>
+            <a:picLocks noChangeAspect="1" noChangeArrowheads="1"/>
+          </p:cNvPicPr>
+          <p:nvPr/>
+        </p:nvPicPr>
+        <p:blipFill>
+          <a:blip r:embed="rId3">
+            <a:extLst>
+              <a:ext uri="{28A0092B-C50C-407E-A947-70E740481C1C}">
+                <a14:useLocalDpi xmlns:a14="http://schemas.microsoft.com/office/drawing/2010/main" val="0"/>
+              </a:ext>
+            </a:extLst>
+          </a:blip>
+          <a:srcRect/>
+          <a:stretch>
+            <a:fillRect/>
+          </a:stretch>
+        </p:blipFill>
+        <p:spPr bwMode="auto">
+          <a:xfrm>
+            <a:off x="4893013" y="1301344"/>
+            <a:ext cx="4656308" cy="3492231"/>
+          </a:xfrm>
+          <a:prstGeom prst="rect">
+            <a:avLst/>
+          </a:prstGeom>
+          <a:noFill/>
+          <a:extLst>
+            <a:ext uri="{909E8E84-426E-40DD-AFC4-6F175D3DCCD1}">
+              <a14:hiddenFill xmlns:a14="http://schemas.microsoft.com/office/drawing/2010/main">
+                <a:solidFill>
+                  <a:srgbClr val="FFFFFF"/>
+                </a:solidFill>
+              </a14:hiddenFill>
+            </a:ext>
+          </a:extLst>
+        </p:spPr>
+      </p:pic>
+      <p:cxnSp>
+        <p:nvCxnSpPr>
+          <p:cNvPr id="6" name="Connecteur droit avec flèche 5">
+            <a:extLst>
+              <a:ext uri="{FF2B5EF4-FFF2-40B4-BE49-F238E27FC236}">
+                <a16:creationId xmlns:a16="http://schemas.microsoft.com/office/drawing/2014/main" id="{B3D1286B-7962-492D-BEB0-2834C6679DD9}"/>
+              </a:ext>
+            </a:extLst>
+          </p:cNvPr>
+          <p:cNvCxnSpPr>
+            <a:cxnSpLocks/>
+          </p:cNvCxnSpPr>
+          <p:nvPr/>
+        </p:nvCxnSpPr>
+        <p:spPr>
+          <a:xfrm flipV="1">
+            <a:off x="4936757" y="3000983"/>
+            <a:ext cx="2981558" cy="598251"/>
+          </a:xfrm>
+          <a:prstGeom prst="straightConnector1">
+            <a:avLst/>
+          </a:prstGeom>
+          <a:ln>
+            <a:solidFill>
+              <a:srgbClr val="C00000"/>
+            </a:solidFill>
+            <a:headEnd type="none" w="med" len="med"/>
+            <a:tailEnd type="arrow" w="med" len="med"/>
+          </a:ln>
+        </p:spPr>
+        <p:style>
+          <a:lnRef idx="3">
+            <a:schemeClr val="accent2"/>
+          </a:lnRef>
+          <a:fillRef idx="0">
+            <a:schemeClr val="accent2"/>
+          </a:fillRef>
+          <a:effectRef idx="2">
+            <a:schemeClr val="accent2"/>
+          </a:effectRef>
+          <a:fontRef idx="minor">
+            <a:schemeClr val="tx1"/>
+          </a:fontRef>
+        </p:style>
+      </p:cxnSp>
+      <p:sp>
+        <p:nvSpPr>
+          <p:cNvPr id="9" name="ZoneTexte 8">
+            <a:extLst>
+              <a:ext uri="{FF2B5EF4-FFF2-40B4-BE49-F238E27FC236}">
+                <a16:creationId xmlns:a16="http://schemas.microsoft.com/office/drawing/2014/main" id="{5D2B2B99-ADF1-4E5A-A77F-671BBE986490}"/>
+              </a:ext>
+            </a:extLst>
+          </p:cNvPr>
+          <p:cNvSpPr txBox="1"/>
+          <p:nvPr/>
+        </p:nvSpPr>
+        <p:spPr>
+          <a:xfrm>
+            <a:off x="4209813" y="3414568"/>
+            <a:ext cx="683200" cy="369332"/>
+          </a:xfrm>
+          <a:prstGeom prst="rect">
+            <a:avLst/>
+          </a:prstGeom>
+          <a:noFill/>
+        </p:spPr>
+        <p:txBody>
+          <a:bodyPr wrap="none" rtlCol="0">
+            <a:spAutoFit/>
+          </a:bodyPr>
+          <a:lstStyle/>
+          <a:p>
+            <a:r>
+              <a:rPr lang="fr-FR" dirty="0">
+                <a:solidFill>
+                  <a:srgbClr val="C00000"/>
+                </a:solidFill>
+              </a:rPr>
+              <a:t>laser</a:t>
+            </a:r>
+          </a:p>
+        </p:txBody>
+      </p:sp>
+      <p:sp>
+        <p:nvSpPr>
+          <p:cNvPr id="13" name="ZoneTexte 12">
+            <a:extLst>
+              <a:ext uri="{FF2B5EF4-FFF2-40B4-BE49-F238E27FC236}">
+                <a16:creationId xmlns:a16="http://schemas.microsoft.com/office/drawing/2014/main" id="{D50B28F4-D6D2-45D9-A52F-A26763E7AFDC}"/>
+              </a:ext>
+            </a:extLst>
+          </p:cNvPr>
+          <p:cNvSpPr txBox="1"/>
+          <p:nvPr/>
+        </p:nvSpPr>
+        <p:spPr>
+          <a:xfrm>
+            <a:off x="341600" y="5221592"/>
+            <a:ext cx="4248724" cy="1477328"/>
+          </a:xfrm>
+          <a:prstGeom prst="rect">
+            <a:avLst/>
+          </a:prstGeom>
+          <a:noFill/>
+        </p:spPr>
+        <p:txBody>
+          <a:bodyPr wrap="square">
+            <a:spAutoFit/>
+          </a:bodyPr>
+          <a:lstStyle/>
+          <a:p>
+            <a:pPr algn="ctr" rtl="0">
+              <a:spcBef>
+                <a:spcPts val="0"/>
+              </a:spcBef>
+              <a:spcAft>
+                <a:spcPts val="0"/>
+              </a:spcAft>
+            </a:pPr>
+            <a:r>
+              <a:rPr lang="fr-FR" sz="1800" b="1" i="0" u="none" strike="noStrike" dirty="0">
+                <a:solidFill>
+                  <a:srgbClr val="000000"/>
+                </a:solidFill>
+                <a:effectLst/>
+                <a:latin typeface="Roboto" panose="02000000000000000000" pitchFamily="2" charset="0"/>
+              </a:rPr>
+              <a:t>Observation </a:t>
+            </a:r>
+            <a:r>
+              <a:rPr lang="fr-FR" sz="1800" b="0" i="0" u="none" strike="noStrike" dirty="0">
+                <a:solidFill>
+                  <a:srgbClr val="000000"/>
+                </a:solidFill>
+                <a:effectLst/>
+                <a:latin typeface="Roboto" panose="02000000000000000000" pitchFamily="2" charset="0"/>
+              </a:rPr>
+              <a:t>:</a:t>
+            </a:r>
+            <a:endParaRPr lang="fr-FR" b="0" dirty="0">
+              <a:effectLst/>
+            </a:endParaRPr>
+          </a:p>
+          <a:p>
+            <a:pPr algn="ctr" rtl="0">
+              <a:spcBef>
+                <a:spcPts val="0"/>
+              </a:spcBef>
+              <a:spcAft>
+                <a:spcPts val="0"/>
+              </a:spcAft>
+            </a:pPr>
+            <a:r>
+              <a:rPr lang="fr-FR" sz="1800" b="0" i="0" u="none" strike="noStrike" dirty="0">
+                <a:solidFill>
+                  <a:srgbClr val="000000"/>
+                </a:solidFill>
+                <a:effectLst/>
+                <a:latin typeface="Roboto" panose="02000000000000000000" pitchFamily="2" charset="0"/>
+              </a:rPr>
+              <a:t>Le Rayon est dévié par le plastique par rapport à une trajectoire idéale</a:t>
+            </a:r>
+            <a:endParaRPr lang="fr-FR" b="0" dirty="0">
+              <a:effectLst/>
+            </a:endParaRPr>
+          </a:p>
+          <a:p>
+            <a:br>
+              <a:rPr lang="fr-FR" dirty="0"/>
+            </a:br>
+            <a:endParaRPr lang="fr-FR" dirty="0"/>
+          </a:p>
+        </p:txBody>
+      </p:sp>
+      <p:sp>
+        <p:nvSpPr>
+          <p:cNvPr id="15" name="ZoneTexte 14">
+            <a:extLst>
+              <a:ext uri="{FF2B5EF4-FFF2-40B4-BE49-F238E27FC236}">
+                <a16:creationId xmlns:a16="http://schemas.microsoft.com/office/drawing/2014/main" id="{CD771C15-5B88-4A51-ACA6-5FF723355DCA}"/>
+              </a:ext>
+            </a:extLst>
+          </p:cNvPr>
+          <p:cNvSpPr txBox="1"/>
+          <p:nvPr/>
+        </p:nvSpPr>
+        <p:spPr>
+          <a:xfrm>
+            <a:off x="5551251" y="5048071"/>
+            <a:ext cx="2658894" cy="1200329"/>
+          </a:xfrm>
+          <a:prstGeom prst="rect">
+            <a:avLst/>
+          </a:prstGeom>
+          <a:noFill/>
+        </p:spPr>
+        <p:txBody>
+          <a:bodyPr wrap="square">
+            <a:spAutoFit/>
+          </a:bodyPr>
+          <a:lstStyle/>
+          <a:p>
+            <a:pPr rtl="0">
+              <a:spcBef>
+                <a:spcPts val="0"/>
+              </a:spcBef>
+              <a:spcAft>
+                <a:spcPts val="0"/>
+              </a:spcAft>
+            </a:pPr>
+            <a:r>
+              <a:rPr lang="fr-FR" sz="1800" b="1" i="0" u="none" strike="noStrike" dirty="0">
+                <a:solidFill>
+                  <a:srgbClr val="000000"/>
+                </a:solidFill>
+                <a:effectLst/>
+                <a:latin typeface="Roboto" panose="02000000000000000000" pitchFamily="2" charset="0"/>
+              </a:rPr>
+              <a:t>Montage : </a:t>
+            </a:r>
+            <a:endParaRPr lang="fr-FR" b="0" dirty="0">
+              <a:effectLst/>
+            </a:endParaRPr>
+          </a:p>
+          <a:p>
+            <a:pPr rtl="0" fontAlgn="base">
+              <a:spcBef>
+                <a:spcPts val="0"/>
+              </a:spcBef>
+              <a:spcAft>
+                <a:spcPts val="0"/>
+              </a:spcAft>
+              <a:buFont typeface="Arial" panose="020B0604020202020204" pitchFamily="34" charset="0"/>
+              <a:buChar char="•"/>
+            </a:pPr>
+            <a:r>
+              <a:rPr lang="fr-FR" sz="1800" b="0" i="0" u="none" strike="noStrike" dirty="0">
+                <a:solidFill>
+                  <a:srgbClr val="000000"/>
+                </a:solidFill>
+                <a:effectLst/>
+                <a:latin typeface="Roboto" panose="02000000000000000000" pitchFamily="2" charset="0"/>
+              </a:rPr>
+              <a:t>Laser rouge</a:t>
+            </a:r>
+          </a:p>
+          <a:p>
+            <a:pPr rtl="0" fontAlgn="base">
+              <a:spcBef>
+                <a:spcPts val="0"/>
+              </a:spcBef>
+              <a:spcAft>
+                <a:spcPts val="0"/>
+              </a:spcAft>
+              <a:buFont typeface="Arial" panose="020B0604020202020204" pitchFamily="34" charset="0"/>
+              <a:buChar char="•"/>
+            </a:pPr>
+            <a:r>
+              <a:rPr lang="fr-FR" sz="1800" b="0" i="0" u="none" strike="noStrike" dirty="0">
+                <a:solidFill>
+                  <a:srgbClr val="000000"/>
+                </a:solidFill>
+                <a:effectLst/>
+                <a:latin typeface="Roboto" panose="02000000000000000000" pitchFamily="2" charset="0"/>
+              </a:rPr>
+              <a:t>Lentille convergente</a:t>
+            </a:r>
+          </a:p>
+          <a:p>
+            <a:pPr rtl="0" fontAlgn="base">
+              <a:spcBef>
+                <a:spcPts val="0"/>
+              </a:spcBef>
+              <a:spcAft>
+                <a:spcPts val="0"/>
+              </a:spcAft>
+              <a:buFont typeface="Arial" panose="020B0604020202020204" pitchFamily="34" charset="0"/>
+              <a:buChar char="•"/>
+            </a:pPr>
+            <a:r>
+              <a:rPr lang="fr-FR" sz="1800" b="0" i="0" u="none" strike="noStrike" dirty="0">
+                <a:solidFill>
+                  <a:srgbClr val="000000"/>
+                </a:solidFill>
+                <a:effectLst/>
+                <a:latin typeface="Roboto" panose="02000000000000000000" pitchFamily="2" charset="0"/>
+              </a:rPr>
+              <a:t>Plastique déformable</a:t>
+            </a:r>
+          </a:p>
+        </p:txBody>
+      </p:sp>
+    </p:spTree>
+    <p:extLst>
+      <p:ext uri="{BB962C8B-B14F-4D97-AF65-F5344CB8AC3E}">
+        <p14:creationId xmlns:p14="http://schemas.microsoft.com/office/powerpoint/2010/main" val="566206286"/>
+      </p:ext>
+    </p:extLst>
+  </p:cSld>
+  <p:clrMapOvr>
+    <a:masterClrMapping/>
+  </p:clrMapOvr>
+</p:sld>
+</file>
+
 <file path=ppt/slides/slide13.xml><?xml version="1.0" encoding="utf-8"?>
 <p:sld xmlns:a="http://schemas.openxmlformats.org/drawingml/2006/main" xmlns:r="http://schemas.openxmlformats.org/officeDocument/2006/relationships" xmlns:p="http://schemas.openxmlformats.org/presentationml/2006/main">
   <p:cSld>
@@ -7270,7 +7377,7 @@
           <p:cNvPr id="2" name="Titre 1">
             <a:extLst>
               <a:ext uri="{FF2B5EF4-FFF2-40B4-BE49-F238E27FC236}">
-                <a16:creationId xmlns:a16="http://schemas.microsoft.com/office/drawing/2014/main" id="{AA72167C-A523-4ACA-8E54-6B6FC3BF1142}"/>
+                <a16:creationId xmlns:a16="http://schemas.microsoft.com/office/drawing/2014/main" id="{DE8E669D-15B5-4CA1-A1B5-5DE422195549}"/>
               </a:ext>
             </a:extLst>
           </p:cNvPr>
@@ -7288,31 +7395,26 @@
           <a:p>
             <a:r>
               <a:rPr lang="fr-FR" dirty="0"/>
-              <a:t>L’</a:t>
-            </a:r>
-            <a:r>
-              <a:rPr lang="fr-FR" dirty="0" err="1"/>
-              <a:t>éxpérience</a:t>
-            </a:r>
-            <a:endParaRPr lang="fr-FR" dirty="0"/>
+              <a:t>Modélisation de la déviation du faisceau</a:t>
+            </a:r>
           </a:p>
         </p:txBody>
       </p:sp>
       <p:pic>
         <p:nvPicPr>
-          <p:cNvPr id="6146" name="Picture 2">
+          <p:cNvPr id="7" name="Image 6">
             <a:extLst>
               <a:ext uri="{FF2B5EF4-FFF2-40B4-BE49-F238E27FC236}">
-                <a16:creationId xmlns:a16="http://schemas.microsoft.com/office/drawing/2014/main" id="{748C01D8-82C1-4242-A5D5-F80C32992C25}"/>
+                <a16:creationId xmlns:a16="http://schemas.microsoft.com/office/drawing/2014/main" id="{BEBB7EB4-E453-24BD-8CFA-3FA5CD4EFA74}"/>
               </a:ext>
             </a:extLst>
           </p:cNvPr>
           <p:cNvPicPr>
-            <a:picLocks noChangeAspect="1" noChangeArrowheads="1"/>
+            <a:picLocks noChangeAspect="1"/>
           </p:cNvPicPr>
           <p:nvPr/>
         </p:nvPicPr>
-        <p:blipFill rotWithShape="1">
+        <p:blipFill>
           <a:blip r:embed="rId2">
             <a:extLst>
               <a:ext uri="{28A0092B-C50C-407E-A947-70E740481C1C}">
@@ -7320,40 +7422,31 @@
               </a:ext>
             </a:extLst>
           </a:blip>
-          <a:srcRect l="40856" t="18236" r="10919" b="48780"/>
-          <a:stretch/>
+          <a:stretch>
+            <a:fillRect/>
+          </a:stretch>
         </p:blipFill>
-        <p:spPr bwMode="auto">
-          <a:xfrm>
-            <a:off x="677334" y="1930400"/>
-            <a:ext cx="3328067" cy="3035030"/>
+        <p:spPr>
+          <a:xfrm>
+            <a:off x="6191027" y="1714499"/>
+            <a:ext cx="2783898" cy="3429001"/>
           </a:xfrm>
           <a:prstGeom prst="rect">
             <a:avLst/>
           </a:prstGeom>
-          <a:noFill/>
-          <a:extLst>
-            <a:ext uri="{909E8E84-426E-40DD-AFC4-6F175D3DCCD1}">
-              <a14:hiddenFill xmlns:a14="http://schemas.microsoft.com/office/drawing/2010/main">
-                <a:solidFill>
-                  <a:srgbClr val="FFFFFF"/>
-                </a:solidFill>
-              </a14:hiddenFill>
-            </a:ext>
-          </a:extLst>
         </p:spPr>
       </p:pic>
       <p:pic>
         <p:nvPicPr>
-          <p:cNvPr id="6148" name="Picture 4">
+          <p:cNvPr id="9" name="Image 8">
             <a:extLst>
               <a:ext uri="{FF2B5EF4-FFF2-40B4-BE49-F238E27FC236}">
-                <a16:creationId xmlns:a16="http://schemas.microsoft.com/office/drawing/2014/main" id="{B80D4406-E771-4395-BE6E-D862D0723812}"/>
+                <a16:creationId xmlns:a16="http://schemas.microsoft.com/office/drawing/2014/main" id="{9203B740-029E-3A85-29CF-E832BA82F5AC}"/>
               </a:ext>
             </a:extLst>
           </p:cNvPr>
           <p:cNvPicPr>
-            <a:picLocks noChangeAspect="1" noChangeArrowheads="1"/>
+            <a:picLocks noChangeAspect="1"/>
           </p:cNvPicPr>
           <p:nvPr/>
         </p:nvPicPr>
@@ -7365,320 +7458,81 @@
               </a:ext>
             </a:extLst>
           </a:blip>
-          <a:srcRect/>
           <a:stretch>
             <a:fillRect/>
           </a:stretch>
         </p:blipFill>
-        <p:spPr bwMode="auto">
-          <a:xfrm>
-            <a:off x="4893013" y="1301344"/>
-            <a:ext cx="4656308" cy="3492231"/>
+        <p:spPr>
+          <a:xfrm>
+            <a:off x="677334" y="2299905"/>
+            <a:ext cx="5852172" cy="4389129"/>
+          </a:xfrm>
+          <a:prstGeom prst="rect">
+            <a:avLst/>
+          </a:prstGeom>
+        </p:spPr>
+      </p:pic>
+      <p:pic>
+        <p:nvPicPr>
+          <p:cNvPr id="25" name="Image 24">
+            <a:extLst>
+              <a:ext uri="{FF2B5EF4-FFF2-40B4-BE49-F238E27FC236}">
+                <a16:creationId xmlns:a16="http://schemas.microsoft.com/office/drawing/2014/main" id="{77CF94AE-C0C5-480C-82C2-4F6D430C1090}"/>
+              </a:ext>
+            </a:extLst>
+          </p:cNvPr>
+          <p:cNvPicPr>
+            <a:picLocks noChangeAspect="1"/>
+          </p:cNvPicPr>
+          <p:nvPr/>
+        </p:nvPicPr>
+        <p:blipFill>
+          <a:blip r:embed="rId4"/>
+          <a:stretch>
+            <a:fillRect/>
+          </a:stretch>
+        </p:blipFill>
+        <p:spPr>
+          <a:xfrm>
+            <a:off x="1612274" y="4789541"/>
+            <a:ext cx="513515" cy="353959"/>
+          </a:xfrm>
+          <a:prstGeom prst="rect">
+            <a:avLst/>
+          </a:prstGeom>
+        </p:spPr>
+      </p:pic>
+      <p:sp>
+        <p:nvSpPr>
+          <p:cNvPr id="3" name="ZoneTexte 2">
+            <a:extLst>
+              <a:ext uri="{FF2B5EF4-FFF2-40B4-BE49-F238E27FC236}">
+                <a16:creationId xmlns:a16="http://schemas.microsoft.com/office/drawing/2014/main" id="{A861F4BC-DE14-4953-4458-45DF4400A572}"/>
+              </a:ext>
+            </a:extLst>
+          </p:cNvPr>
+          <p:cNvSpPr txBox="1"/>
+          <p:nvPr/>
+        </p:nvSpPr>
+        <p:spPr>
+          <a:xfrm>
+            <a:off x="1372085" y="1606822"/>
+            <a:ext cx="4462670" cy="646331"/>
           </a:xfrm>
           <a:prstGeom prst="rect">
             <a:avLst/>
           </a:prstGeom>
           <a:noFill/>
-          <a:extLst>
-            <a:ext uri="{909E8E84-426E-40DD-AFC4-6F175D3DCCD1}">
-              <a14:hiddenFill xmlns:a14="http://schemas.microsoft.com/office/drawing/2010/main">
-                <a:solidFill>
-                  <a:srgbClr val="FFFFFF"/>
-                </a:solidFill>
-              </a14:hiddenFill>
-            </a:ext>
-          </a:extLst>
-        </p:spPr>
-      </p:pic>
-      <p:cxnSp>
-        <p:nvCxnSpPr>
-          <p:cNvPr id="6" name="Connecteur droit avec flèche 5">
-            <a:extLst>
-              <a:ext uri="{FF2B5EF4-FFF2-40B4-BE49-F238E27FC236}">
-                <a16:creationId xmlns:a16="http://schemas.microsoft.com/office/drawing/2014/main" id="{B3D1286B-7962-492D-BEB0-2834C6679DD9}"/>
-              </a:ext>
-            </a:extLst>
-          </p:cNvPr>
-          <p:cNvCxnSpPr>
-            <a:cxnSpLocks/>
-          </p:cNvCxnSpPr>
-          <p:nvPr/>
-        </p:nvCxnSpPr>
-        <p:spPr>
-          <a:xfrm flipV="1">
-            <a:off x="4936757" y="3000983"/>
-            <a:ext cx="2981558" cy="598251"/>
-          </a:xfrm>
-          <a:prstGeom prst="straightConnector1">
-            <a:avLst/>
-          </a:prstGeom>
-          <a:ln>
-            <a:solidFill>
-              <a:srgbClr val="C00000"/>
-            </a:solidFill>
-            <a:headEnd type="none" w="med" len="med"/>
-            <a:tailEnd type="arrow" w="med" len="med"/>
-          </a:ln>
-        </p:spPr>
-        <p:style>
-          <a:lnRef idx="3">
-            <a:schemeClr val="accent2"/>
-          </a:lnRef>
-          <a:fillRef idx="0">
-            <a:schemeClr val="accent2"/>
-          </a:fillRef>
-          <a:effectRef idx="2">
-            <a:schemeClr val="accent2"/>
-          </a:effectRef>
-          <a:fontRef idx="minor">
-            <a:schemeClr val="tx1"/>
-          </a:fontRef>
-        </p:style>
-      </p:cxnSp>
-      <p:sp>
-        <p:nvSpPr>
-          <p:cNvPr id="9" name="ZoneTexte 8">
-            <a:extLst>
-              <a:ext uri="{FF2B5EF4-FFF2-40B4-BE49-F238E27FC236}">
-                <a16:creationId xmlns:a16="http://schemas.microsoft.com/office/drawing/2014/main" id="{5D2B2B99-ADF1-4E5A-A77F-671BBE986490}"/>
-              </a:ext>
-            </a:extLst>
-          </p:cNvPr>
-          <p:cNvSpPr txBox="1"/>
-          <p:nvPr/>
-        </p:nvSpPr>
-        <p:spPr>
-          <a:xfrm>
-            <a:off x="4209813" y="3414568"/>
-            <a:ext cx="683200" cy="369332"/>
-          </a:xfrm>
-          <a:prstGeom prst="rect">
-            <a:avLst/>
-          </a:prstGeom>
-          <a:noFill/>
-        </p:spPr>
-        <p:txBody>
-          <a:bodyPr wrap="none" rtlCol="0">
+        </p:spPr>
+        <p:txBody>
+          <a:bodyPr wrap="square" rtlCol="0">
             <a:spAutoFit/>
           </a:bodyPr>
           <a:lstStyle/>
           <a:p>
             <a:r>
-              <a:rPr lang="fr-FR" dirty="0">
-                <a:solidFill>
-                  <a:srgbClr val="C00000"/>
-                </a:solidFill>
-              </a:rPr>
-              <a:t>laser</a:t>
-            </a:r>
-          </a:p>
-        </p:txBody>
-      </p:sp>
-      <p:sp>
-        <p:nvSpPr>
-          <p:cNvPr id="13" name="ZoneTexte 12">
-            <a:extLst>
-              <a:ext uri="{FF2B5EF4-FFF2-40B4-BE49-F238E27FC236}">
-                <a16:creationId xmlns:a16="http://schemas.microsoft.com/office/drawing/2014/main" id="{D50B28F4-D6D2-45D9-A52F-A26763E7AFDC}"/>
-              </a:ext>
-            </a:extLst>
-          </p:cNvPr>
-          <p:cNvSpPr txBox="1"/>
-          <p:nvPr/>
-        </p:nvSpPr>
-        <p:spPr>
-          <a:xfrm>
-            <a:off x="341600" y="5221592"/>
-            <a:ext cx="4248724" cy="1477328"/>
-          </a:xfrm>
-          <a:prstGeom prst="rect">
-            <a:avLst/>
-          </a:prstGeom>
-          <a:noFill/>
-        </p:spPr>
-        <p:txBody>
-          <a:bodyPr wrap="square">
-            <a:spAutoFit/>
-          </a:bodyPr>
-          <a:lstStyle/>
-          <a:p>
-            <a:pPr algn="ctr" rtl="0">
-              <a:spcBef>
-                <a:spcPts val="0"/>
-              </a:spcBef>
-              <a:spcAft>
-                <a:spcPts val="0"/>
-              </a:spcAft>
-            </a:pPr>
-            <a:r>
-              <a:rPr lang="fr-FR" sz="1800" b="1" i="0" u="none" strike="noStrike" dirty="0">
-                <a:solidFill>
-                  <a:srgbClr val="000000"/>
-                </a:solidFill>
-                <a:effectLst/>
-                <a:latin typeface="Roboto" panose="02000000000000000000" pitchFamily="2" charset="0"/>
-              </a:rPr>
-              <a:t>Observation </a:t>
-            </a:r>
-            <a:r>
-              <a:rPr lang="fr-FR" sz="1800" b="0" i="0" u="none" strike="noStrike" dirty="0">
-                <a:solidFill>
-                  <a:srgbClr val="000000"/>
-                </a:solidFill>
-                <a:effectLst/>
-                <a:latin typeface="Roboto" panose="02000000000000000000" pitchFamily="2" charset="0"/>
-              </a:rPr>
-              <a:t>:</a:t>
-            </a:r>
-            <a:endParaRPr lang="fr-FR" b="0" dirty="0">
-              <a:effectLst/>
-            </a:endParaRPr>
-          </a:p>
-          <a:p>
-            <a:pPr algn="ctr" rtl="0">
-              <a:spcBef>
-                <a:spcPts val="0"/>
-              </a:spcBef>
-              <a:spcAft>
-                <a:spcPts val="0"/>
-              </a:spcAft>
-            </a:pPr>
-            <a:r>
-              <a:rPr lang="fr-FR" sz="1800" b="0" i="0" u="none" strike="noStrike" dirty="0">
-                <a:solidFill>
-                  <a:srgbClr val="000000"/>
-                </a:solidFill>
-                <a:effectLst/>
-                <a:latin typeface="Roboto" panose="02000000000000000000" pitchFamily="2" charset="0"/>
-              </a:rPr>
-              <a:t>Le Rayon est dévié par le plastique par rapport à une trajectoire idéale</a:t>
-            </a:r>
-            <a:endParaRPr lang="fr-FR" b="0" dirty="0">
-              <a:effectLst/>
-            </a:endParaRPr>
-          </a:p>
-          <a:p>
-            <a:br>
               <a:rPr lang="fr-FR" dirty="0"/>
-            </a:br>
-            <a:endParaRPr lang="fr-FR" dirty="0"/>
-          </a:p>
-        </p:txBody>
-      </p:sp>
-      <p:sp>
-        <p:nvSpPr>
-          <p:cNvPr id="15" name="ZoneTexte 14">
-            <a:extLst>
-              <a:ext uri="{FF2B5EF4-FFF2-40B4-BE49-F238E27FC236}">
-                <a16:creationId xmlns:a16="http://schemas.microsoft.com/office/drawing/2014/main" id="{CD771C15-5B88-4A51-ACA6-5FF723355DCA}"/>
-              </a:ext>
-            </a:extLst>
-          </p:cNvPr>
-          <p:cNvSpPr txBox="1"/>
-          <p:nvPr/>
-        </p:nvSpPr>
-        <p:spPr>
-          <a:xfrm>
-            <a:off x="5551251" y="5048071"/>
-            <a:ext cx="2658894" cy="1200329"/>
-          </a:xfrm>
-          <a:prstGeom prst="rect">
-            <a:avLst/>
-          </a:prstGeom>
-          <a:noFill/>
-        </p:spPr>
-        <p:txBody>
-          <a:bodyPr wrap="square">
-            <a:spAutoFit/>
-          </a:bodyPr>
-          <a:lstStyle/>
-          <a:p>
-            <a:pPr rtl="0">
-              <a:spcBef>
-                <a:spcPts val="0"/>
-              </a:spcBef>
-              <a:spcAft>
-                <a:spcPts val="0"/>
-              </a:spcAft>
-            </a:pPr>
-            <a:r>
-              <a:rPr lang="fr-FR" sz="1800" b="1" i="0" u="none" strike="noStrike" dirty="0">
-                <a:solidFill>
-                  <a:srgbClr val="000000"/>
-                </a:solidFill>
-                <a:effectLst/>
-                <a:latin typeface="Roboto" panose="02000000000000000000" pitchFamily="2" charset="0"/>
-              </a:rPr>
-              <a:t>Montage : </a:t>
-            </a:r>
-            <a:endParaRPr lang="fr-FR" b="0" dirty="0">
-              <a:effectLst/>
-            </a:endParaRPr>
-          </a:p>
-          <a:p>
-            <a:pPr rtl="0" fontAlgn="base">
-              <a:spcBef>
-                <a:spcPts val="0"/>
-              </a:spcBef>
-              <a:spcAft>
-                <a:spcPts val="0"/>
-              </a:spcAft>
-              <a:buFont typeface="Arial" panose="020B0604020202020204" pitchFamily="34" charset="0"/>
-              <a:buChar char="•"/>
-            </a:pPr>
-            <a:r>
-              <a:rPr lang="fr-FR" sz="1800" b="0" i="0" u="none" strike="noStrike" dirty="0">
-                <a:solidFill>
-                  <a:srgbClr val="000000"/>
-                </a:solidFill>
-                <a:effectLst/>
-                <a:latin typeface="Roboto" panose="02000000000000000000" pitchFamily="2" charset="0"/>
-              </a:rPr>
-              <a:t>Laser rouge</a:t>
-            </a:r>
-          </a:p>
-          <a:p>
-            <a:pPr rtl="0" fontAlgn="base">
-              <a:spcBef>
-                <a:spcPts val="0"/>
-              </a:spcBef>
-              <a:spcAft>
-                <a:spcPts val="0"/>
-              </a:spcAft>
-              <a:buFont typeface="Arial" panose="020B0604020202020204" pitchFamily="34" charset="0"/>
-              <a:buChar char="•"/>
-            </a:pPr>
-            <a:r>
-              <a:rPr lang="fr-FR" sz="1800" b="0" i="0" u="none" strike="noStrike" dirty="0">
-                <a:solidFill>
-                  <a:srgbClr val="000000"/>
-                </a:solidFill>
-                <a:effectLst/>
-                <a:latin typeface="Roboto" panose="02000000000000000000" pitchFamily="2" charset="0"/>
-              </a:rPr>
-              <a:t>Lentille convergente</a:t>
-            </a:r>
-          </a:p>
-          <a:p>
-            <a:pPr rtl="0" fontAlgn="base">
-              <a:spcBef>
-                <a:spcPts val="0"/>
-              </a:spcBef>
-              <a:spcAft>
-                <a:spcPts val="0"/>
-              </a:spcAft>
-              <a:buFont typeface="Arial" panose="020B0604020202020204" pitchFamily="34" charset="0"/>
-              <a:buChar char="•"/>
-            </a:pPr>
-            <a:r>
-              <a:rPr lang="fr-FR" sz="1800" b="0" i="0" u="none" strike="noStrike" dirty="0">
-                <a:solidFill>
-                  <a:srgbClr val="000000"/>
-                </a:solidFill>
-                <a:effectLst/>
-                <a:latin typeface="Roboto" panose="02000000000000000000" pitchFamily="2" charset="0"/>
-              </a:rPr>
-              <a:t>Plastique déformable</a:t>
+              <a:t>On assimile localement le pochon à deux sphères concentriques de rayon différent</a:t>
             </a:r>
           </a:p>
         </p:txBody>
@@ -7686,7 +7540,7 @@
     </p:spTree>
     <p:extLst>
       <p:ext uri="{BB962C8B-B14F-4D97-AF65-F5344CB8AC3E}">
-        <p14:creationId xmlns:p14="http://schemas.microsoft.com/office/powerpoint/2010/main" val="566206286"/>
+        <p14:creationId xmlns:p14="http://schemas.microsoft.com/office/powerpoint/2010/main" val="1944304529"/>
       </p:ext>
     </p:extLst>
   </p:cSld>
@@ -7718,7 +7572,7 @@
           <p:cNvPr id="2" name="Titre 1">
             <a:extLst>
               <a:ext uri="{FF2B5EF4-FFF2-40B4-BE49-F238E27FC236}">
-                <a16:creationId xmlns:a16="http://schemas.microsoft.com/office/drawing/2014/main" id="{DE8E669D-15B5-4CA1-A1B5-5DE422195549}"/>
+                <a16:creationId xmlns:a16="http://schemas.microsoft.com/office/drawing/2014/main" id="{BF3F014C-F5F3-4E57-9C80-D318DA6E0E93}"/>
               </a:ext>
             </a:extLst>
           </p:cNvPr>
@@ -7736,26 +7590,26 @@
           <a:p>
             <a:r>
               <a:rPr lang="fr-FR" dirty="0"/>
-              <a:t>Modélisation de la déviation du faisceau</a:t>
+              <a:t>Résultats de l’expérience</a:t>
             </a:r>
           </a:p>
         </p:txBody>
       </p:sp>
       <p:pic>
         <p:nvPicPr>
-          <p:cNvPr id="7" name="Image 6">
+          <p:cNvPr id="5" name="Picture 2">
             <a:extLst>
               <a:ext uri="{FF2B5EF4-FFF2-40B4-BE49-F238E27FC236}">
-                <a16:creationId xmlns:a16="http://schemas.microsoft.com/office/drawing/2014/main" id="{BEBB7EB4-E453-24BD-8CFA-3FA5CD4EFA74}"/>
+                <a16:creationId xmlns:a16="http://schemas.microsoft.com/office/drawing/2014/main" id="{CE1DB45B-7379-4688-9241-84E4FCB1B12E}"/>
               </a:ext>
             </a:extLst>
           </p:cNvPr>
           <p:cNvPicPr>
-            <a:picLocks noChangeAspect="1"/>
+            <a:picLocks noChangeAspect="1" noChangeArrowheads="1"/>
           </p:cNvPicPr>
           <p:nvPr/>
         </p:nvPicPr>
-        <p:blipFill>
+        <p:blipFill rotWithShape="1">
           <a:blip r:embed="rId2">
             <a:extLst>
               <a:ext uri="{28A0092B-C50C-407E-A947-70E740481C1C}">
@@ -7763,31 +7617,40 @@
               </a:ext>
             </a:extLst>
           </a:blip>
-          <a:stretch>
-            <a:fillRect/>
-          </a:stretch>
+          <a:srcRect l="40856" t="18236" r="10919" b="48780"/>
+          <a:stretch/>
         </p:blipFill>
-        <p:spPr>
-          <a:xfrm>
-            <a:off x="6191027" y="1714499"/>
-            <a:ext cx="2783898" cy="3429001"/>
+        <p:spPr bwMode="auto">
+          <a:xfrm>
+            <a:off x="978892" y="1648614"/>
+            <a:ext cx="2513338" cy="2292038"/>
           </a:xfrm>
           <a:prstGeom prst="rect">
             <a:avLst/>
           </a:prstGeom>
+          <a:noFill/>
+          <a:extLst>
+            <a:ext uri="{909E8E84-426E-40DD-AFC4-6F175D3DCCD1}">
+              <a14:hiddenFill xmlns:a14="http://schemas.microsoft.com/office/drawing/2010/main">
+                <a:solidFill>
+                  <a:srgbClr val="FFFFFF"/>
+                </a:solidFill>
+              </a14:hiddenFill>
+            </a:ext>
+          </a:extLst>
         </p:spPr>
       </p:pic>
       <p:pic>
         <p:nvPicPr>
-          <p:cNvPr id="9" name="Image 8">
+          <p:cNvPr id="7172" name="Picture 4">
             <a:extLst>
               <a:ext uri="{FF2B5EF4-FFF2-40B4-BE49-F238E27FC236}">
-                <a16:creationId xmlns:a16="http://schemas.microsoft.com/office/drawing/2014/main" id="{9203B740-029E-3A85-29CF-E832BA82F5AC}"/>
+                <a16:creationId xmlns:a16="http://schemas.microsoft.com/office/drawing/2014/main" id="{C282618F-A559-4A7F-98C3-1CA44BF22A5B}"/>
               </a:ext>
             </a:extLst>
           </p:cNvPr>
           <p:cNvPicPr>
-            <a:picLocks noChangeAspect="1"/>
+            <a:picLocks noChangeAspect="1" noChangeArrowheads="1"/>
           </p:cNvPicPr>
           <p:nvPr/>
         </p:nvPicPr>
@@ -7799,54 +7662,227 @@
               </a:ext>
             </a:extLst>
           </a:blip>
+          <a:srcRect/>
           <a:stretch>
             <a:fillRect/>
           </a:stretch>
         </p:blipFill>
-        <p:spPr>
-          <a:xfrm>
-            <a:off x="677334" y="2468871"/>
-            <a:ext cx="5852172" cy="4389129"/>
+        <p:spPr bwMode="auto">
+          <a:xfrm>
+            <a:off x="4810298" y="1425102"/>
+            <a:ext cx="3543300" cy="2362200"/>
           </a:xfrm>
           <a:prstGeom prst="rect">
             <a:avLst/>
           </a:prstGeom>
+          <a:noFill/>
+          <a:extLst>
+            <a:ext uri="{909E8E84-426E-40DD-AFC4-6F175D3DCCD1}">
+              <a14:hiddenFill xmlns:a14="http://schemas.microsoft.com/office/drawing/2010/main">
+                <a:solidFill>
+                  <a:srgbClr val="FFFFFF"/>
+                </a:solidFill>
+              </a14:hiddenFill>
+            </a:ext>
+          </a:extLst>
         </p:spPr>
       </p:pic>
       <p:pic>
         <p:nvPicPr>
-          <p:cNvPr id="25" name="Image 24">
+          <p:cNvPr id="7174" name="Picture 6">
             <a:extLst>
               <a:ext uri="{FF2B5EF4-FFF2-40B4-BE49-F238E27FC236}">
-                <a16:creationId xmlns:a16="http://schemas.microsoft.com/office/drawing/2014/main" id="{77CF94AE-C0C5-480C-82C2-4F6D430C1090}"/>
+                <a16:creationId xmlns:a16="http://schemas.microsoft.com/office/drawing/2014/main" id="{590C773D-F038-4D56-864E-25A4CAD49CE9}"/>
               </a:ext>
             </a:extLst>
           </p:cNvPr>
           <p:cNvPicPr>
-            <a:picLocks noChangeAspect="1"/>
+            <a:picLocks noChangeAspect="1" noChangeArrowheads="1"/>
           </p:cNvPicPr>
           <p:nvPr/>
         </p:nvPicPr>
         <p:blipFill>
-          <a:blip r:embed="rId4"/>
+          <a:blip r:embed="rId4">
+            <a:extLst>
+              <a:ext uri="{28A0092B-C50C-407E-A947-70E740481C1C}">
+                <a14:useLocalDpi xmlns:a14="http://schemas.microsoft.com/office/drawing/2010/main" val="0"/>
+              </a:ext>
+            </a:extLst>
+          </a:blip>
+          <a:srcRect/>
           <a:stretch>
             <a:fillRect/>
           </a:stretch>
         </p:blipFill>
-        <p:spPr>
-          <a:xfrm>
-            <a:off x="1612274" y="4789541"/>
-            <a:ext cx="513515" cy="353959"/>
+        <p:spPr bwMode="auto">
+          <a:xfrm>
+            <a:off x="492261" y="4183704"/>
+            <a:ext cx="3600450" cy="2362200"/>
           </a:xfrm>
           <a:prstGeom prst="rect">
             <a:avLst/>
           </a:prstGeom>
+          <a:noFill/>
+          <a:extLst>
+            <a:ext uri="{909E8E84-426E-40DD-AFC4-6F175D3DCCD1}">
+              <a14:hiddenFill xmlns:a14="http://schemas.microsoft.com/office/drawing/2010/main">
+                <a:solidFill>
+                  <a:srgbClr val="FFFFFF"/>
+                </a:solidFill>
+              </a14:hiddenFill>
+            </a:ext>
+          </a:extLst>
         </p:spPr>
       </p:pic>
+      <p:pic>
+        <p:nvPicPr>
+          <p:cNvPr id="7176" name="Picture 8">
+            <a:extLst>
+              <a:ext uri="{FF2B5EF4-FFF2-40B4-BE49-F238E27FC236}">
+                <a16:creationId xmlns:a16="http://schemas.microsoft.com/office/drawing/2014/main" id="{CBCAE848-1160-4BDB-BCC2-CC6F70BB1A12}"/>
+              </a:ext>
+            </a:extLst>
+          </p:cNvPr>
+          <p:cNvPicPr>
+            <a:picLocks noChangeAspect="1" noChangeArrowheads="1"/>
+          </p:cNvPicPr>
+          <p:nvPr/>
+        </p:nvPicPr>
+        <p:blipFill rotWithShape="1">
+          <a:blip r:embed="rId5">
+            <a:extLst>
+              <a:ext uri="{28A0092B-C50C-407E-A947-70E740481C1C}">
+                <a14:useLocalDpi xmlns:a14="http://schemas.microsoft.com/office/drawing/2010/main" val="0"/>
+              </a:ext>
+            </a:extLst>
+          </a:blip>
+          <a:srcRect l="23003" t="4966" r="63361" b="81422"/>
+          <a:stretch/>
+        </p:blipFill>
+        <p:spPr bwMode="auto">
+          <a:xfrm>
+            <a:off x="4975668" y="4388124"/>
+            <a:ext cx="2412091" cy="1579794"/>
+          </a:xfrm>
+          <a:prstGeom prst="rect">
+            <a:avLst/>
+          </a:prstGeom>
+          <a:noFill/>
+          <a:extLst>
+            <a:ext uri="{909E8E84-426E-40DD-AFC4-6F175D3DCCD1}">
+              <a14:hiddenFill xmlns:a14="http://schemas.microsoft.com/office/drawing/2010/main">
+                <a:solidFill>
+                  <a:srgbClr val="FFFFFF"/>
+                </a:solidFill>
+              </a14:hiddenFill>
+            </a:ext>
+          </a:extLst>
+        </p:spPr>
+      </p:pic>
+      <p:cxnSp>
+        <p:nvCxnSpPr>
+          <p:cNvPr id="4" name="Connecteur droit avec flèche 3">
+            <a:extLst>
+              <a:ext uri="{FF2B5EF4-FFF2-40B4-BE49-F238E27FC236}">
+                <a16:creationId xmlns:a16="http://schemas.microsoft.com/office/drawing/2014/main" id="{4E9955D1-6C0F-42D4-8485-6097828683FB}"/>
+              </a:ext>
+            </a:extLst>
+          </p:cNvPr>
+          <p:cNvCxnSpPr>
+            <a:cxnSpLocks/>
+          </p:cNvCxnSpPr>
+          <p:nvPr/>
+        </p:nvCxnSpPr>
+        <p:spPr>
+          <a:xfrm flipH="1">
+            <a:off x="5525311" y="4727643"/>
+            <a:ext cx="214008" cy="0"/>
+          </a:xfrm>
+          <a:prstGeom prst="straightConnector1">
+            <a:avLst/>
+          </a:prstGeom>
+          <a:ln>
+            <a:solidFill>
+              <a:srgbClr val="FF0000"/>
+            </a:solidFill>
+            <a:tailEnd type="triangle"/>
+          </a:ln>
+        </p:spPr>
+        <p:style>
+          <a:lnRef idx="2">
+            <a:schemeClr val="dk1"/>
+          </a:lnRef>
+          <a:fillRef idx="0">
+            <a:schemeClr val="dk1"/>
+          </a:fillRef>
+          <a:effectRef idx="1">
+            <a:schemeClr val="dk1"/>
+          </a:effectRef>
+          <a:fontRef idx="minor">
+            <a:schemeClr val="tx1"/>
+          </a:fontRef>
+        </p:style>
+      </p:cxnSp>
+      <p:sp>
+        <p:nvSpPr>
+          <p:cNvPr id="7" name="ZoneTexte 6">
+            <a:extLst>
+              <a:ext uri="{FF2B5EF4-FFF2-40B4-BE49-F238E27FC236}">
+                <a16:creationId xmlns:a16="http://schemas.microsoft.com/office/drawing/2014/main" id="{852EC6A4-374E-42B9-A904-3C1CCDC14482}"/>
+              </a:ext>
+            </a:extLst>
+          </p:cNvPr>
+          <p:cNvSpPr txBox="1"/>
+          <p:nvPr/>
+        </p:nvSpPr>
+        <p:spPr>
+          <a:xfrm>
+            <a:off x="5434985" y="4727643"/>
+            <a:ext cx="394660" cy="307777"/>
+          </a:xfrm>
+          <a:prstGeom prst="rect">
+            <a:avLst/>
+          </a:prstGeom>
+          <a:noFill/>
+        </p:spPr>
+        <p:txBody>
+          <a:bodyPr wrap="none" rtlCol="0">
+            <a:spAutoFit/>
+          </a:bodyPr>
+          <a:lstStyle/>
+          <a:p>
+            <a:r>
+              <a:rPr lang="el-GR" sz="1400" b="0" i="0" dirty="0">
+                <a:solidFill>
+                  <a:srgbClr val="FF0000"/>
+                </a:solidFill>
+                <a:effectLst/>
+                <a:latin typeface="arial" panose="020B0604020202020204" pitchFamily="34" charset="0"/>
+              </a:rPr>
+              <a:t>Δ</a:t>
+            </a:r>
+            <a:r>
+              <a:rPr lang="fr-FR" sz="1400" b="0" i="0" dirty="0">
+                <a:solidFill>
+                  <a:srgbClr val="FF0000"/>
+                </a:solidFill>
+                <a:effectLst/>
+                <a:latin typeface="arial" panose="020B0604020202020204" pitchFamily="34" charset="0"/>
+              </a:rPr>
+              <a:t>x</a:t>
+            </a:r>
+            <a:endParaRPr lang="fr-FR" sz="1400" dirty="0">
+              <a:solidFill>
+                <a:srgbClr val="FF0000"/>
+              </a:solidFill>
+            </a:endParaRPr>
+          </a:p>
+        </p:txBody>
+      </p:sp>
     </p:spTree>
     <p:extLst>
       <p:ext uri="{BB962C8B-B14F-4D97-AF65-F5344CB8AC3E}">
-        <p14:creationId xmlns:p14="http://schemas.microsoft.com/office/powerpoint/2010/main" val="1944304529"/>
+        <p14:creationId xmlns:p14="http://schemas.microsoft.com/office/powerpoint/2010/main" val="726612940"/>
       </p:ext>
     </p:extLst>
   </p:cSld>
@@ -7878,348 +7914,6 @@
           <p:cNvPr id="2" name="Titre 1">
             <a:extLst>
               <a:ext uri="{FF2B5EF4-FFF2-40B4-BE49-F238E27FC236}">
-                <a16:creationId xmlns:a16="http://schemas.microsoft.com/office/drawing/2014/main" id="{BF3F014C-F5F3-4E57-9C80-D318DA6E0E93}"/>
-              </a:ext>
-            </a:extLst>
-          </p:cNvPr>
-          <p:cNvSpPr>
-            <a:spLocks noGrp="1"/>
-          </p:cNvSpPr>
-          <p:nvPr>
-            <p:ph type="title"/>
-          </p:nvPr>
-        </p:nvSpPr>
-        <p:spPr/>
-        <p:txBody>
-          <a:bodyPr/>
-          <a:lstStyle/>
-          <a:p>
-            <a:r>
-              <a:rPr lang="fr-FR" dirty="0"/>
-              <a:t>Résultats de l’expérience</a:t>
-            </a:r>
-          </a:p>
-        </p:txBody>
-      </p:sp>
-      <p:pic>
-        <p:nvPicPr>
-          <p:cNvPr id="5" name="Picture 2">
-            <a:extLst>
-              <a:ext uri="{FF2B5EF4-FFF2-40B4-BE49-F238E27FC236}">
-                <a16:creationId xmlns:a16="http://schemas.microsoft.com/office/drawing/2014/main" id="{CE1DB45B-7379-4688-9241-84E4FCB1B12E}"/>
-              </a:ext>
-            </a:extLst>
-          </p:cNvPr>
-          <p:cNvPicPr>
-            <a:picLocks noChangeAspect="1" noChangeArrowheads="1"/>
-          </p:cNvPicPr>
-          <p:nvPr/>
-        </p:nvPicPr>
-        <p:blipFill rotWithShape="1">
-          <a:blip r:embed="rId2">
-            <a:extLst>
-              <a:ext uri="{28A0092B-C50C-407E-A947-70E740481C1C}">
-                <a14:useLocalDpi xmlns:a14="http://schemas.microsoft.com/office/drawing/2010/main" val="0"/>
-              </a:ext>
-            </a:extLst>
-          </a:blip>
-          <a:srcRect l="40856" t="18236" r="10919" b="48780"/>
-          <a:stretch/>
-        </p:blipFill>
-        <p:spPr bwMode="auto">
-          <a:xfrm>
-            <a:off x="978892" y="1648614"/>
-            <a:ext cx="2513338" cy="2292038"/>
-          </a:xfrm>
-          <a:prstGeom prst="rect">
-            <a:avLst/>
-          </a:prstGeom>
-          <a:noFill/>
-          <a:extLst>
-            <a:ext uri="{909E8E84-426E-40DD-AFC4-6F175D3DCCD1}">
-              <a14:hiddenFill xmlns:a14="http://schemas.microsoft.com/office/drawing/2010/main">
-                <a:solidFill>
-                  <a:srgbClr val="FFFFFF"/>
-                </a:solidFill>
-              </a14:hiddenFill>
-            </a:ext>
-          </a:extLst>
-        </p:spPr>
-      </p:pic>
-      <p:pic>
-        <p:nvPicPr>
-          <p:cNvPr id="7172" name="Picture 4">
-            <a:extLst>
-              <a:ext uri="{FF2B5EF4-FFF2-40B4-BE49-F238E27FC236}">
-                <a16:creationId xmlns:a16="http://schemas.microsoft.com/office/drawing/2014/main" id="{C282618F-A559-4A7F-98C3-1CA44BF22A5B}"/>
-              </a:ext>
-            </a:extLst>
-          </p:cNvPr>
-          <p:cNvPicPr>
-            <a:picLocks noChangeAspect="1" noChangeArrowheads="1"/>
-          </p:cNvPicPr>
-          <p:nvPr/>
-        </p:nvPicPr>
-        <p:blipFill>
-          <a:blip r:embed="rId3">
-            <a:extLst>
-              <a:ext uri="{28A0092B-C50C-407E-A947-70E740481C1C}">
-                <a14:useLocalDpi xmlns:a14="http://schemas.microsoft.com/office/drawing/2010/main" val="0"/>
-              </a:ext>
-            </a:extLst>
-          </a:blip>
-          <a:srcRect/>
-          <a:stretch>
-            <a:fillRect/>
-          </a:stretch>
-        </p:blipFill>
-        <p:spPr bwMode="auto">
-          <a:xfrm>
-            <a:off x="4810298" y="1425102"/>
-            <a:ext cx="3543300" cy="2362200"/>
-          </a:xfrm>
-          <a:prstGeom prst="rect">
-            <a:avLst/>
-          </a:prstGeom>
-          <a:noFill/>
-          <a:extLst>
-            <a:ext uri="{909E8E84-426E-40DD-AFC4-6F175D3DCCD1}">
-              <a14:hiddenFill xmlns:a14="http://schemas.microsoft.com/office/drawing/2010/main">
-                <a:solidFill>
-                  <a:srgbClr val="FFFFFF"/>
-                </a:solidFill>
-              </a14:hiddenFill>
-            </a:ext>
-          </a:extLst>
-        </p:spPr>
-      </p:pic>
-      <p:pic>
-        <p:nvPicPr>
-          <p:cNvPr id="7174" name="Picture 6">
-            <a:extLst>
-              <a:ext uri="{FF2B5EF4-FFF2-40B4-BE49-F238E27FC236}">
-                <a16:creationId xmlns:a16="http://schemas.microsoft.com/office/drawing/2014/main" id="{590C773D-F038-4D56-864E-25A4CAD49CE9}"/>
-              </a:ext>
-            </a:extLst>
-          </p:cNvPr>
-          <p:cNvPicPr>
-            <a:picLocks noChangeAspect="1" noChangeArrowheads="1"/>
-          </p:cNvPicPr>
-          <p:nvPr/>
-        </p:nvPicPr>
-        <p:blipFill>
-          <a:blip r:embed="rId4">
-            <a:extLst>
-              <a:ext uri="{28A0092B-C50C-407E-A947-70E740481C1C}">
-                <a14:useLocalDpi xmlns:a14="http://schemas.microsoft.com/office/drawing/2010/main" val="0"/>
-              </a:ext>
-            </a:extLst>
-          </a:blip>
-          <a:srcRect/>
-          <a:stretch>
-            <a:fillRect/>
-          </a:stretch>
-        </p:blipFill>
-        <p:spPr bwMode="auto">
-          <a:xfrm>
-            <a:off x="492261" y="4183704"/>
-            <a:ext cx="3600450" cy="2362200"/>
-          </a:xfrm>
-          <a:prstGeom prst="rect">
-            <a:avLst/>
-          </a:prstGeom>
-          <a:noFill/>
-          <a:extLst>
-            <a:ext uri="{909E8E84-426E-40DD-AFC4-6F175D3DCCD1}">
-              <a14:hiddenFill xmlns:a14="http://schemas.microsoft.com/office/drawing/2010/main">
-                <a:solidFill>
-                  <a:srgbClr val="FFFFFF"/>
-                </a:solidFill>
-              </a14:hiddenFill>
-            </a:ext>
-          </a:extLst>
-        </p:spPr>
-      </p:pic>
-      <p:pic>
-        <p:nvPicPr>
-          <p:cNvPr id="7176" name="Picture 8">
-            <a:extLst>
-              <a:ext uri="{FF2B5EF4-FFF2-40B4-BE49-F238E27FC236}">
-                <a16:creationId xmlns:a16="http://schemas.microsoft.com/office/drawing/2014/main" id="{CBCAE848-1160-4BDB-BCC2-CC6F70BB1A12}"/>
-              </a:ext>
-            </a:extLst>
-          </p:cNvPr>
-          <p:cNvPicPr>
-            <a:picLocks noChangeAspect="1" noChangeArrowheads="1"/>
-          </p:cNvPicPr>
-          <p:nvPr/>
-        </p:nvPicPr>
-        <p:blipFill rotWithShape="1">
-          <a:blip r:embed="rId5">
-            <a:extLst>
-              <a:ext uri="{28A0092B-C50C-407E-A947-70E740481C1C}">
-                <a14:useLocalDpi xmlns:a14="http://schemas.microsoft.com/office/drawing/2010/main" val="0"/>
-              </a:ext>
-            </a:extLst>
-          </a:blip>
-          <a:srcRect l="23003" t="4966" r="63361" b="81422"/>
-          <a:stretch/>
-        </p:blipFill>
-        <p:spPr bwMode="auto">
-          <a:xfrm>
-            <a:off x="4975668" y="4388124"/>
-            <a:ext cx="2412091" cy="1579794"/>
-          </a:xfrm>
-          <a:prstGeom prst="rect">
-            <a:avLst/>
-          </a:prstGeom>
-          <a:noFill/>
-          <a:extLst>
-            <a:ext uri="{909E8E84-426E-40DD-AFC4-6F175D3DCCD1}">
-              <a14:hiddenFill xmlns:a14="http://schemas.microsoft.com/office/drawing/2010/main">
-                <a:solidFill>
-                  <a:srgbClr val="FFFFFF"/>
-                </a:solidFill>
-              </a14:hiddenFill>
-            </a:ext>
-          </a:extLst>
-        </p:spPr>
-      </p:pic>
-      <p:cxnSp>
-        <p:nvCxnSpPr>
-          <p:cNvPr id="4" name="Connecteur droit avec flèche 3">
-            <a:extLst>
-              <a:ext uri="{FF2B5EF4-FFF2-40B4-BE49-F238E27FC236}">
-                <a16:creationId xmlns:a16="http://schemas.microsoft.com/office/drawing/2014/main" id="{4E9955D1-6C0F-42D4-8485-6097828683FB}"/>
-              </a:ext>
-            </a:extLst>
-          </p:cNvPr>
-          <p:cNvCxnSpPr>
-            <a:cxnSpLocks/>
-          </p:cNvCxnSpPr>
-          <p:nvPr/>
-        </p:nvCxnSpPr>
-        <p:spPr>
-          <a:xfrm flipH="1">
-            <a:off x="5525311" y="4727643"/>
-            <a:ext cx="214008" cy="0"/>
-          </a:xfrm>
-          <a:prstGeom prst="straightConnector1">
-            <a:avLst/>
-          </a:prstGeom>
-          <a:ln>
-            <a:solidFill>
-              <a:srgbClr val="FF0000"/>
-            </a:solidFill>
-            <a:tailEnd type="triangle"/>
-          </a:ln>
-        </p:spPr>
-        <p:style>
-          <a:lnRef idx="2">
-            <a:schemeClr val="dk1"/>
-          </a:lnRef>
-          <a:fillRef idx="0">
-            <a:schemeClr val="dk1"/>
-          </a:fillRef>
-          <a:effectRef idx="1">
-            <a:schemeClr val="dk1"/>
-          </a:effectRef>
-          <a:fontRef idx="minor">
-            <a:schemeClr val="tx1"/>
-          </a:fontRef>
-        </p:style>
-      </p:cxnSp>
-      <p:sp>
-        <p:nvSpPr>
-          <p:cNvPr id="7" name="ZoneTexte 6">
-            <a:extLst>
-              <a:ext uri="{FF2B5EF4-FFF2-40B4-BE49-F238E27FC236}">
-                <a16:creationId xmlns:a16="http://schemas.microsoft.com/office/drawing/2014/main" id="{852EC6A4-374E-42B9-A904-3C1CCDC14482}"/>
-              </a:ext>
-            </a:extLst>
-          </p:cNvPr>
-          <p:cNvSpPr txBox="1"/>
-          <p:nvPr/>
-        </p:nvSpPr>
-        <p:spPr>
-          <a:xfrm>
-            <a:off x="5434985" y="4727643"/>
-            <a:ext cx="394660" cy="307777"/>
-          </a:xfrm>
-          <a:prstGeom prst="rect">
-            <a:avLst/>
-          </a:prstGeom>
-          <a:noFill/>
-        </p:spPr>
-        <p:txBody>
-          <a:bodyPr wrap="none" rtlCol="0">
-            <a:spAutoFit/>
-          </a:bodyPr>
-          <a:lstStyle/>
-          <a:p>
-            <a:r>
-              <a:rPr lang="el-GR" sz="1400" b="0" i="0" dirty="0">
-                <a:solidFill>
-                  <a:srgbClr val="FF0000"/>
-                </a:solidFill>
-                <a:effectLst/>
-                <a:latin typeface="arial" panose="020B0604020202020204" pitchFamily="34" charset="0"/>
-              </a:rPr>
-              <a:t>Δ</a:t>
-            </a:r>
-            <a:r>
-              <a:rPr lang="fr-FR" sz="1400" b="0" i="0" dirty="0">
-                <a:solidFill>
-                  <a:srgbClr val="FF0000"/>
-                </a:solidFill>
-                <a:effectLst/>
-                <a:latin typeface="arial" panose="020B0604020202020204" pitchFamily="34" charset="0"/>
-              </a:rPr>
-              <a:t>x</a:t>
-            </a:r>
-            <a:endParaRPr lang="fr-FR" sz="1400" dirty="0">
-              <a:solidFill>
-                <a:srgbClr val="FF0000"/>
-              </a:solidFill>
-            </a:endParaRPr>
-          </a:p>
-        </p:txBody>
-      </p:sp>
-    </p:spTree>
-    <p:extLst>
-      <p:ext uri="{BB962C8B-B14F-4D97-AF65-F5344CB8AC3E}">
-        <p14:creationId xmlns:p14="http://schemas.microsoft.com/office/powerpoint/2010/main" val="726612940"/>
-      </p:ext>
-    </p:extLst>
-  </p:cSld>
-  <p:clrMapOvr>
-    <a:masterClrMapping/>
-  </p:clrMapOvr>
-</p:sld>
-</file>
-
-<file path=ppt/slides/slide16.xml><?xml version="1.0" encoding="utf-8"?>
-<p:sld xmlns:a="http://schemas.openxmlformats.org/drawingml/2006/main" xmlns:r="http://schemas.openxmlformats.org/officeDocument/2006/relationships" xmlns:p="http://schemas.openxmlformats.org/presentationml/2006/main">
-  <p:cSld>
-    <p:spTree>
-      <p:nvGrpSpPr>
-        <p:cNvPr id="1" name=""/>
-        <p:cNvGrpSpPr/>
-        <p:nvPr/>
-      </p:nvGrpSpPr>
-      <p:grpSpPr>
-        <a:xfrm>
-          <a:off x="0" y="0"/>
-          <a:ext cx="0" cy="0"/>
-          <a:chOff x="0" y="0"/>
-          <a:chExt cx="0" cy="0"/>
-        </a:xfrm>
-      </p:grpSpPr>
-      <p:sp>
-        <p:nvSpPr>
-          <p:cNvPr id="2" name="Titre 1">
-            <a:extLst>
-              <a:ext uri="{FF2B5EF4-FFF2-40B4-BE49-F238E27FC236}">
                 <a16:creationId xmlns:a16="http://schemas.microsoft.com/office/drawing/2014/main" id="{95CD0BC0-462F-4C56-A62D-862843C9D851}"/>
               </a:ext>
             </a:extLst>
@@ -8515,7 +8209,7 @@
 </p:sld>
 </file>
 
-<file path=ppt/slides/slide17.xml><?xml version="1.0" encoding="utf-8"?>
+<file path=ppt/slides/slide16.xml><?xml version="1.0" encoding="utf-8"?>
 <p:sld xmlns:a="http://schemas.openxmlformats.org/drawingml/2006/main" xmlns:r="http://schemas.openxmlformats.org/officeDocument/2006/relationships" xmlns:p="http://schemas.openxmlformats.org/presentationml/2006/main">
   <p:cSld>
     <p:spTree>
@@ -8838,10 +8532,86 @@
       </mc:AlternateContent>
       <p:pic>
         <p:nvPicPr>
-          <p:cNvPr id="9" name="Image 8">
+          <p:cNvPr id="13" name="Image 12">
             <a:extLst>
               <a:ext uri="{FF2B5EF4-FFF2-40B4-BE49-F238E27FC236}">
-                <a16:creationId xmlns:a16="http://schemas.microsoft.com/office/drawing/2014/main" id="{CF224AEF-6765-8B0D-6104-158A257DADBF}"/>
+                <a16:creationId xmlns:a16="http://schemas.microsoft.com/office/drawing/2014/main" id="{D94A15CC-34DC-7611-BAEA-EA6A24838180}"/>
+              </a:ext>
+            </a:extLst>
+          </p:cNvPr>
+          <p:cNvPicPr>
+            <a:picLocks noChangeAspect="1"/>
+          </p:cNvPicPr>
+          <p:nvPr/>
+        </p:nvPicPr>
+        <p:blipFill rotWithShape="1">
+          <a:blip r:embed="rId13">
+            <a:extLst>
+              <a:ext uri="{28A0092B-C50C-407E-A947-70E740481C1C}">
+                <a14:useLocalDpi xmlns:a14="http://schemas.microsoft.com/office/drawing/2010/main" val="0"/>
+              </a:ext>
+            </a:extLst>
+          </a:blip>
+          <a:srcRect l="23934" r="23934"/>
+          <a:stretch/>
+        </p:blipFill>
+        <p:spPr>
+          <a:xfrm>
+            <a:off x="677334" y="2041433"/>
+            <a:ext cx="4420939" cy="4206967"/>
+          </a:xfrm>
+          <a:prstGeom prst="rect">
+            <a:avLst/>
+          </a:prstGeom>
+        </p:spPr>
+      </p:pic>
+      <p:sp>
+        <p:nvSpPr>
+          <p:cNvPr id="14" name="ZoneTexte 13">
+            <a:extLst>
+              <a:ext uri="{FF2B5EF4-FFF2-40B4-BE49-F238E27FC236}">
+                <a16:creationId xmlns:a16="http://schemas.microsoft.com/office/drawing/2014/main" id="{0FEC88D3-FED7-2214-528C-89B13456BBD8}"/>
+              </a:ext>
+            </a:extLst>
+          </p:cNvPr>
+          <p:cNvSpPr txBox="1"/>
+          <p:nvPr/>
+        </p:nvSpPr>
+        <p:spPr>
+          <a:xfrm>
+            <a:off x="5534839" y="1362094"/>
+            <a:ext cx="3906078" cy="1500808"/>
+          </a:xfrm>
+          <a:prstGeom prst="rect">
+            <a:avLst/>
+          </a:prstGeom>
+          <a:noFill/>
+        </p:spPr>
+        <p:txBody>
+          <a:bodyPr wrap="square" rtlCol="0">
+            <a:spAutoFit/>
+          </a:bodyPr>
+          <a:lstStyle/>
+          <a:p>
+            <a:r>
+              <a:rPr lang="fr-FR" dirty="0"/>
+              <a:t>Sur chaque point de notre maillage, on a la normale en ce point.</a:t>
+            </a:r>
+          </a:p>
+          <a:p>
+            <a:r>
+              <a:rPr lang="fr-FR" dirty="0"/>
+              <a:t>On a donc fait une moyenne pour retrouver les autres points à partir d’un seul.</a:t>
+            </a:r>
+          </a:p>
+        </p:txBody>
+      </p:sp>
+      <p:pic>
+        <p:nvPicPr>
+          <p:cNvPr id="16" name="Image 15">
+            <a:extLst>
+              <a:ext uri="{FF2B5EF4-FFF2-40B4-BE49-F238E27FC236}">
+                <a16:creationId xmlns:a16="http://schemas.microsoft.com/office/drawing/2014/main" id="{A039CF07-6997-3930-A4F1-CC9A43EE764B}"/>
               </a:ext>
             </a:extLst>
           </p:cNvPr>
@@ -8851,7 +8621,7 @@
           <p:nvPr/>
         </p:nvPicPr>
         <p:blipFill>
-          <a:blip r:embed="rId13">
+          <a:blip r:embed="rId14">
             <a:extLst>
               <a:ext uri="{28A0092B-C50C-407E-A947-70E740481C1C}">
                 <a14:useLocalDpi xmlns:a14="http://schemas.microsoft.com/office/drawing/2010/main" val="0"/>
@@ -8864,8 +8634,8 @@
         </p:blipFill>
         <p:spPr>
           <a:xfrm>
-            <a:off x="677334" y="1270000"/>
-            <a:ext cx="5852172" cy="4389129"/>
+            <a:off x="5830783" y="3056582"/>
+            <a:ext cx="2829339" cy="2901303"/>
           </a:xfrm>
           <a:prstGeom prst="rect">
             <a:avLst/>
@@ -8876,6 +8646,477 @@
     <p:extLst>
       <p:ext uri="{BB962C8B-B14F-4D97-AF65-F5344CB8AC3E}">
         <p14:creationId xmlns:p14="http://schemas.microsoft.com/office/powerpoint/2010/main" val="3583617699"/>
+      </p:ext>
+    </p:extLst>
+  </p:cSld>
+  <p:clrMapOvr>
+    <a:masterClrMapping/>
+  </p:clrMapOvr>
+</p:sld>
+</file>
+
+<file path=ppt/slides/slide17.xml><?xml version="1.0" encoding="utf-8"?>
+<p:sld xmlns:a="http://schemas.openxmlformats.org/drawingml/2006/main" xmlns:r="http://schemas.openxmlformats.org/officeDocument/2006/relationships" xmlns:p="http://schemas.openxmlformats.org/presentationml/2006/main">
+  <p:cSld>
+    <p:spTree>
+      <p:nvGrpSpPr>
+        <p:cNvPr id="1" name=""/>
+        <p:cNvGrpSpPr/>
+        <p:nvPr/>
+      </p:nvGrpSpPr>
+      <p:grpSpPr>
+        <a:xfrm>
+          <a:off x="0" y="0"/>
+          <a:ext cx="0" cy="0"/>
+          <a:chOff x="0" y="0"/>
+          <a:chExt cx="0" cy="0"/>
+        </a:xfrm>
+      </p:grpSpPr>
+      <p:sp>
+        <p:nvSpPr>
+          <p:cNvPr id="2" name="Titre 1">
+            <a:extLst>
+              <a:ext uri="{FF2B5EF4-FFF2-40B4-BE49-F238E27FC236}">
+                <a16:creationId xmlns:a16="http://schemas.microsoft.com/office/drawing/2014/main" id="{A825D48C-A90B-4503-AC45-98D1F2BA297C}"/>
+              </a:ext>
+            </a:extLst>
+          </p:cNvPr>
+          <p:cNvSpPr>
+            <a:spLocks noGrp="1"/>
+          </p:cNvSpPr>
+          <p:nvPr>
+            <p:ph type="title"/>
+          </p:nvPr>
+        </p:nvSpPr>
+        <p:spPr/>
+        <p:txBody>
+          <a:bodyPr>
+            <a:normAutofit fontScale="90000"/>
+          </a:bodyPr>
+          <a:lstStyle/>
+          <a:p>
+            <a:r>
+              <a:rPr lang="fr-FR" dirty="0"/>
+              <a:t>III) </a:t>
+            </a:r>
+            <a:r>
+              <a:rPr lang="fr-FR" sz="3600" dirty="0"/>
+              <a:t>Traitement informatique du front d’onde reçu</a:t>
+            </a:r>
+            <a:br>
+              <a:rPr lang="fr-FR" sz="3600" dirty="0">
+                <a:solidFill>
+                  <a:schemeClr val="tx1"/>
+                </a:solidFill>
+              </a:rPr>
+            </a:br>
+            <a:endParaRPr lang="fr-FR" dirty="0"/>
+          </a:p>
+        </p:txBody>
+      </p:sp>
+      <p:pic>
+        <p:nvPicPr>
+          <p:cNvPr id="1026" name="Picture 2">
+            <a:extLst>
+              <a:ext uri="{FF2B5EF4-FFF2-40B4-BE49-F238E27FC236}">
+                <a16:creationId xmlns:a16="http://schemas.microsoft.com/office/drawing/2014/main" id="{22170EF6-FAB5-47D0-B0B1-47F2ECC59250}"/>
+              </a:ext>
+            </a:extLst>
+          </p:cNvPr>
+          <p:cNvPicPr>
+            <a:picLocks noChangeAspect="1" noChangeArrowheads="1"/>
+          </p:cNvPicPr>
+          <p:nvPr/>
+        </p:nvPicPr>
+        <p:blipFill>
+          <a:blip r:embed="rId2">
+            <a:extLst>
+              <a:ext uri="{28A0092B-C50C-407E-A947-70E740481C1C}">
+                <a14:useLocalDpi xmlns:a14="http://schemas.microsoft.com/office/drawing/2010/main" val="0"/>
+              </a:ext>
+            </a:extLst>
+          </a:blip>
+          <a:srcRect/>
+          <a:stretch>
+            <a:fillRect/>
+          </a:stretch>
+        </p:blipFill>
+        <p:spPr bwMode="auto">
+          <a:xfrm>
+            <a:off x="5491234" y="2329234"/>
+            <a:ext cx="3621932" cy="3621932"/>
+          </a:xfrm>
+          <a:prstGeom prst="rect">
+            <a:avLst/>
+          </a:prstGeom>
+          <a:noFill/>
+          <a:extLst>
+            <a:ext uri="{909E8E84-426E-40DD-AFC4-6F175D3DCCD1}">
+              <a14:hiddenFill xmlns:a14="http://schemas.microsoft.com/office/drawing/2010/main">
+                <a:solidFill>
+                  <a:srgbClr val="FFFFFF"/>
+                </a:solidFill>
+              </a14:hiddenFill>
+            </a:ext>
+          </a:extLst>
+        </p:spPr>
+      </p:pic>
+      <p:pic>
+        <p:nvPicPr>
+          <p:cNvPr id="1028" name="Picture 4">
+            <a:extLst>
+              <a:ext uri="{FF2B5EF4-FFF2-40B4-BE49-F238E27FC236}">
+                <a16:creationId xmlns:a16="http://schemas.microsoft.com/office/drawing/2014/main" id="{ED4EC7F0-0A8F-4118-ABA1-BF0CCD58028F}"/>
+              </a:ext>
+            </a:extLst>
+          </p:cNvPr>
+          <p:cNvPicPr>
+            <a:picLocks noChangeAspect="1" noChangeArrowheads="1"/>
+          </p:cNvPicPr>
+          <p:nvPr/>
+        </p:nvPicPr>
+        <p:blipFill>
+          <a:blip r:embed="rId3">
+            <a:extLst>
+              <a:ext uri="{28A0092B-C50C-407E-A947-70E740481C1C}">
+                <a14:useLocalDpi xmlns:a14="http://schemas.microsoft.com/office/drawing/2010/main" val="0"/>
+              </a:ext>
+            </a:extLst>
+          </a:blip>
+          <a:srcRect/>
+          <a:stretch>
+            <a:fillRect/>
+          </a:stretch>
+        </p:blipFill>
+        <p:spPr bwMode="auto">
+          <a:xfrm>
+            <a:off x="416703" y="4927601"/>
+            <a:ext cx="1028700" cy="695325"/>
+          </a:xfrm>
+          <a:prstGeom prst="rect">
+            <a:avLst/>
+          </a:prstGeom>
+          <a:noFill/>
+          <a:extLst>
+            <a:ext uri="{909E8E84-426E-40DD-AFC4-6F175D3DCCD1}">
+              <a14:hiddenFill xmlns:a14="http://schemas.microsoft.com/office/drawing/2010/main">
+                <a:solidFill>
+                  <a:srgbClr val="FFFFFF"/>
+                </a:solidFill>
+              </a14:hiddenFill>
+            </a:ext>
+          </a:extLst>
+        </p:spPr>
+      </p:pic>
+      <p:sp>
+        <p:nvSpPr>
+          <p:cNvPr id="7" name="ZoneTexte 6">
+            <a:extLst>
+              <a:ext uri="{FF2B5EF4-FFF2-40B4-BE49-F238E27FC236}">
+                <a16:creationId xmlns:a16="http://schemas.microsoft.com/office/drawing/2014/main" id="{0BC7C078-EEF3-4D4E-A3C5-AFD6096F9430}"/>
+              </a:ext>
+            </a:extLst>
+          </p:cNvPr>
+          <p:cNvSpPr txBox="1"/>
+          <p:nvPr/>
+        </p:nvSpPr>
+        <p:spPr>
+          <a:xfrm>
+            <a:off x="1445403" y="4927601"/>
+            <a:ext cx="3819727" cy="1200329"/>
+          </a:xfrm>
+          <a:prstGeom prst="rect">
+            <a:avLst/>
+          </a:prstGeom>
+          <a:noFill/>
+        </p:spPr>
+        <p:txBody>
+          <a:bodyPr wrap="square">
+            <a:spAutoFit/>
+          </a:bodyPr>
+          <a:lstStyle/>
+          <a:p>
+            <a:pPr rtl="0">
+              <a:spcBef>
+                <a:spcPts val="0"/>
+              </a:spcBef>
+              <a:spcAft>
+                <a:spcPts val="0"/>
+              </a:spcAft>
+            </a:pPr>
+            <a:r>
+              <a:rPr lang="fr-FR" sz="1800" b="0" i="0" u="none" strike="noStrike" dirty="0">
+                <a:solidFill>
+                  <a:srgbClr val="000000"/>
+                </a:solidFill>
+                <a:effectLst/>
+                <a:latin typeface="Roboto" panose="02000000000000000000" pitchFamily="2" charset="0"/>
+              </a:rPr>
+              <a:t>m = nombre de méridiens affectés</a:t>
+            </a:r>
+            <a:endParaRPr lang="fr-FR" b="0" dirty="0">
+              <a:effectLst/>
+            </a:endParaRPr>
+          </a:p>
+          <a:p>
+            <a:pPr rtl="0">
+              <a:spcBef>
+                <a:spcPts val="0"/>
+              </a:spcBef>
+              <a:spcAft>
+                <a:spcPts val="0"/>
+              </a:spcAft>
+            </a:pPr>
+            <a:r>
+              <a:rPr lang="fr-FR" sz="1800" b="0" i="0" u="none" strike="noStrike" dirty="0">
+                <a:solidFill>
+                  <a:srgbClr val="000000"/>
+                </a:solidFill>
+                <a:effectLst/>
+                <a:latin typeface="Roboto" panose="02000000000000000000" pitchFamily="2" charset="0"/>
+              </a:rPr>
+              <a:t>n = ordre du polynôme</a:t>
+            </a:r>
+            <a:endParaRPr lang="fr-FR" b="0" dirty="0">
+              <a:effectLst/>
+            </a:endParaRPr>
+          </a:p>
+          <a:p>
+            <a:br>
+              <a:rPr lang="fr-FR" b="0" dirty="0">
+                <a:effectLst/>
+              </a:rPr>
+            </a:br>
+            <a:endParaRPr lang="fr-FR" dirty="0"/>
+          </a:p>
+        </p:txBody>
+      </p:sp>
+      <p:sp>
+        <p:nvSpPr>
+          <p:cNvPr id="6" name="ZoneTexte 5">
+            <a:extLst>
+              <a:ext uri="{FF2B5EF4-FFF2-40B4-BE49-F238E27FC236}">
+                <a16:creationId xmlns:a16="http://schemas.microsoft.com/office/drawing/2014/main" id="{A5B0F3C0-2F1E-49CC-8F5C-754D73AF888A}"/>
+              </a:ext>
+            </a:extLst>
+          </p:cNvPr>
+          <p:cNvSpPr txBox="1"/>
+          <p:nvPr/>
+        </p:nvSpPr>
+        <p:spPr>
+          <a:xfrm>
+            <a:off x="3377313" y="1609246"/>
+            <a:ext cx="3196709" cy="461665"/>
+          </a:xfrm>
+          <a:prstGeom prst="rect">
+            <a:avLst/>
+          </a:prstGeom>
+          <a:noFill/>
+        </p:spPr>
+        <p:txBody>
+          <a:bodyPr wrap="none" rtlCol="0">
+            <a:spAutoFit/>
+          </a:bodyPr>
+          <a:lstStyle/>
+          <a:p>
+            <a:r>
+              <a:rPr lang="fr-FR" sz="2400" dirty="0"/>
+              <a:t>Polynômes de Zernike</a:t>
+            </a:r>
+          </a:p>
+        </p:txBody>
+      </p:sp>
+      <p:pic>
+        <p:nvPicPr>
+          <p:cNvPr id="4" name="Image 3">
+            <a:extLst>
+              <a:ext uri="{FF2B5EF4-FFF2-40B4-BE49-F238E27FC236}">
+                <a16:creationId xmlns:a16="http://schemas.microsoft.com/office/drawing/2014/main" id="{6A81A77F-7C9F-4B8F-8918-D844677C238B}"/>
+              </a:ext>
+            </a:extLst>
+          </p:cNvPr>
+          <p:cNvPicPr>
+            <a:picLocks noChangeAspect="1"/>
+          </p:cNvPicPr>
+          <p:nvPr/>
+        </p:nvPicPr>
+        <p:blipFill rotWithShape="1">
+          <a:blip r:embed="rId4">
+            <a:extLst>
+              <a:ext uri="{28A0092B-C50C-407E-A947-70E740481C1C}">
+                <a14:useLocalDpi xmlns:a14="http://schemas.microsoft.com/office/drawing/2010/main" val="0"/>
+              </a:ext>
+            </a:extLst>
+          </a:blip>
+          <a:srcRect l="67836" b="80741"/>
+          <a:stretch/>
+        </p:blipFill>
+        <p:spPr>
+          <a:xfrm>
+            <a:off x="3762560" y="3035920"/>
+            <a:ext cx="2154565" cy="1612659"/>
+          </a:xfrm>
+          <a:prstGeom prst="rect">
+            <a:avLst/>
+          </a:prstGeom>
+        </p:spPr>
+      </p:pic>
+      <p:pic>
+        <p:nvPicPr>
+          <p:cNvPr id="9" name="Image 8">
+            <a:extLst>
+              <a:ext uri="{FF2B5EF4-FFF2-40B4-BE49-F238E27FC236}">
+                <a16:creationId xmlns:a16="http://schemas.microsoft.com/office/drawing/2014/main" id="{87A4BDA3-C183-48E7-98FC-E01F07E3579C}"/>
+              </a:ext>
+            </a:extLst>
+          </p:cNvPr>
+          <p:cNvPicPr>
+            <a:picLocks noChangeAspect="1"/>
+          </p:cNvPicPr>
+          <p:nvPr/>
+        </p:nvPicPr>
+        <p:blipFill rotWithShape="1">
+          <a:blip r:embed="rId4">
+            <a:extLst>
+              <a:ext uri="{28A0092B-C50C-407E-A947-70E740481C1C}">
+                <a14:useLocalDpi xmlns:a14="http://schemas.microsoft.com/office/drawing/2010/main" val="0"/>
+              </a:ext>
+            </a:extLst>
+          </a:blip>
+          <a:srcRect l="34096" r="32279" b="82606"/>
+          <a:stretch/>
+        </p:blipFill>
+        <p:spPr>
+          <a:xfrm>
+            <a:off x="7583134" y="1298672"/>
+            <a:ext cx="2154565" cy="1393159"/>
+          </a:xfrm>
+          <a:prstGeom prst="rect">
+            <a:avLst/>
+          </a:prstGeom>
+        </p:spPr>
+      </p:pic>
+      <p:cxnSp>
+        <p:nvCxnSpPr>
+          <p:cNvPr id="14" name="Connecteur droit avec flèche 13">
+            <a:extLst>
+              <a:ext uri="{FF2B5EF4-FFF2-40B4-BE49-F238E27FC236}">
+                <a16:creationId xmlns:a16="http://schemas.microsoft.com/office/drawing/2014/main" id="{A44D274E-1A26-42B2-B36E-B008DB65F16A}"/>
+              </a:ext>
+            </a:extLst>
+          </p:cNvPr>
+          <p:cNvCxnSpPr>
+            <a:cxnSpLocks/>
+          </p:cNvCxnSpPr>
+          <p:nvPr/>
+        </p:nvCxnSpPr>
+        <p:spPr>
+          <a:xfrm flipH="1">
+            <a:off x="5963055" y="3636085"/>
+            <a:ext cx="379379" cy="0"/>
+          </a:xfrm>
+          <a:prstGeom prst="straightConnector1">
+            <a:avLst/>
+          </a:prstGeom>
+          <a:ln>
+            <a:tailEnd type="triangle"/>
+          </a:ln>
+        </p:spPr>
+        <p:style>
+          <a:lnRef idx="2">
+            <a:schemeClr val="dk1"/>
+          </a:lnRef>
+          <a:fillRef idx="0">
+            <a:schemeClr val="dk1"/>
+          </a:fillRef>
+          <a:effectRef idx="1">
+            <a:schemeClr val="dk1"/>
+          </a:effectRef>
+          <a:fontRef idx="minor">
+            <a:schemeClr val="tx1"/>
+          </a:fontRef>
+        </p:style>
+      </p:cxnSp>
+      <p:cxnSp>
+        <p:nvCxnSpPr>
+          <p:cNvPr id="20" name="Connecteur droit avec flèche 19">
+            <a:extLst>
+              <a:ext uri="{FF2B5EF4-FFF2-40B4-BE49-F238E27FC236}">
+                <a16:creationId xmlns:a16="http://schemas.microsoft.com/office/drawing/2014/main" id="{D9FE2977-00B0-4FE5-9405-7871D3B84C9A}"/>
+              </a:ext>
+            </a:extLst>
+          </p:cNvPr>
+          <p:cNvCxnSpPr>
+            <a:cxnSpLocks/>
+          </p:cNvCxnSpPr>
+          <p:nvPr/>
+        </p:nvCxnSpPr>
+        <p:spPr>
+          <a:xfrm flipV="1">
+            <a:off x="7890498" y="2435756"/>
+            <a:ext cx="601749" cy="685295"/>
+          </a:xfrm>
+          <a:prstGeom prst="straightConnector1">
+            <a:avLst/>
+          </a:prstGeom>
+          <a:ln>
+            <a:tailEnd type="triangle"/>
+          </a:ln>
+        </p:spPr>
+        <p:style>
+          <a:lnRef idx="2">
+            <a:schemeClr val="dk1"/>
+          </a:lnRef>
+          <a:fillRef idx="0">
+            <a:schemeClr val="dk1"/>
+          </a:fillRef>
+          <a:effectRef idx="1">
+            <a:schemeClr val="dk1"/>
+          </a:effectRef>
+          <a:fontRef idx="minor">
+            <a:schemeClr val="tx1"/>
+          </a:fontRef>
+        </p:style>
+      </p:cxnSp>
+      <p:sp>
+        <p:nvSpPr>
+          <p:cNvPr id="3" name="ZoneTexte 2">
+            <a:extLst>
+              <a:ext uri="{FF2B5EF4-FFF2-40B4-BE49-F238E27FC236}">
+                <a16:creationId xmlns:a16="http://schemas.microsoft.com/office/drawing/2014/main" id="{938DDD5D-FDD3-7373-32F7-8F8F4A33769E}"/>
+              </a:ext>
+            </a:extLst>
+          </p:cNvPr>
+          <p:cNvSpPr txBox="1"/>
+          <p:nvPr/>
+        </p:nvSpPr>
+        <p:spPr>
+          <a:xfrm>
+            <a:off x="677333" y="2666588"/>
+            <a:ext cx="2373979" cy="369332"/>
+          </a:xfrm>
+          <a:prstGeom prst="rect">
+            <a:avLst/>
+          </a:prstGeom>
+          <a:noFill/>
+        </p:spPr>
+        <p:txBody>
+          <a:bodyPr wrap="square" rtlCol="0">
+            <a:spAutoFit/>
+          </a:bodyPr>
+          <a:lstStyle/>
+          <a:p>
+            <a:r>
+              <a:rPr lang="fr-FR" dirty="0"/>
+              <a:t>Base du disque unité </a:t>
+            </a:r>
+          </a:p>
+        </p:txBody>
+      </p:sp>
+    </p:spTree>
+    <p:extLst>
+      <p:ext uri="{BB962C8B-B14F-4D97-AF65-F5344CB8AC3E}">
+        <p14:creationId xmlns:p14="http://schemas.microsoft.com/office/powerpoint/2010/main" val="2600506359"/>
       </p:ext>
     </p:extLst>
   </p:cSld>
@@ -8907,7 +9148,7 @@
           <p:cNvPr id="2" name="Titre 1">
             <a:extLst>
               <a:ext uri="{FF2B5EF4-FFF2-40B4-BE49-F238E27FC236}">
-                <a16:creationId xmlns:a16="http://schemas.microsoft.com/office/drawing/2014/main" id="{A825D48C-A90B-4503-AC45-98D1F2BA297C}"/>
+                <a16:creationId xmlns:a16="http://schemas.microsoft.com/office/drawing/2014/main" id="{2327E90D-33B7-2CED-F37A-3AA68301A1EC}"/>
               </a:ext>
             </a:extLst>
           </p:cNvPr>
@@ -8920,273 +9161,12 @@
         </p:nvSpPr>
         <p:spPr/>
         <p:txBody>
-          <a:bodyPr>
-            <a:normAutofit fontScale="90000"/>
-          </a:bodyPr>
+          <a:bodyPr/>
           <a:lstStyle/>
           <a:p>
             <a:r>
               <a:rPr lang="fr-FR" dirty="0"/>
-              <a:t>III) </a:t>
-            </a:r>
-            <a:r>
-              <a:rPr lang="fr-FR" sz="3600" dirty="0"/>
-              <a:t>Traitement informatique du front d’onde reçu</a:t>
-            </a:r>
-            <a:br>
-              <a:rPr lang="fr-FR" sz="3600" dirty="0">
-                <a:solidFill>
-                  <a:schemeClr val="tx1"/>
-                </a:solidFill>
-              </a:rPr>
-            </a:br>
-            <a:endParaRPr lang="fr-FR" dirty="0"/>
-          </a:p>
-        </p:txBody>
-      </p:sp>
-      <p:pic>
-        <p:nvPicPr>
-          <p:cNvPr id="1026" name="Picture 2">
-            <a:extLst>
-              <a:ext uri="{FF2B5EF4-FFF2-40B4-BE49-F238E27FC236}">
-                <a16:creationId xmlns:a16="http://schemas.microsoft.com/office/drawing/2014/main" id="{22170EF6-FAB5-47D0-B0B1-47F2ECC59250}"/>
-              </a:ext>
-            </a:extLst>
-          </p:cNvPr>
-          <p:cNvPicPr>
-            <a:picLocks noChangeAspect="1" noChangeArrowheads="1"/>
-          </p:cNvPicPr>
-          <p:nvPr/>
-        </p:nvPicPr>
-        <p:blipFill>
-          <a:blip r:embed="rId2">
-            <a:extLst>
-              <a:ext uri="{28A0092B-C50C-407E-A947-70E740481C1C}">
-                <a14:useLocalDpi xmlns:a14="http://schemas.microsoft.com/office/drawing/2010/main" val="0"/>
-              </a:ext>
-            </a:extLst>
-          </a:blip>
-          <a:srcRect/>
-          <a:stretch>
-            <a:fillRect/>
-          </a:stretch>
-        </p:blipFill>
-        <p:spPr bwMode="auto">
-          <a:xfrm>
-            <a:off x="5491234" y="2329234"/>
-            <a:ext cx="3621932" cy="3621932"/>
-          </a:xfrm>
-          <a:prstGeom prst="rect">
-            <a:avLst/>
-          </a:prstGeom>
-          <a:noFill/>
-          <a:extLst>
-            <a:ext uri="{909E8E84-426E-40DD-AFC4-6F175D3DCCD1}">
-              <a14:hiddenFill xmlns:a14="http://schemas.microsoft.com/office/drawing/2010/main">
-                <a:solidFill>
-                  <a:srgbClr val="FFFFFF"/>
-                </a:solidFill>
-              </a14:hiddenFill>
-            </a:ext>
-          </a:extLst>
-        </p:spPr>
-      </p:pic>
-      <p:pic>
-        <p:nvPicPr>
-          <p:cNvPr id="1028" name="Picture 4">
-            <a:extLst>
-              <a:ext uri="{FF2B5EF4-FFF2-40B4-BE49-F238E27FC236}">
-                <a16:creationId xmlns:a16="http://schemas.microsoft.com/office/drawing/2014/main" id="{ED4EC7F0-0A8F-4118-ABA1-BF0CCD58028F}"/>
-              </a:ext>
-            </a:extLst>
-          </p:cNvPr>
-          <p:cNvPicPr>
-            <a:picLocks noChangeAspect="1" noChangeArrowheads="1"/>
-          </p:cNvPicPr>
-          <p:nvPr/>
-        </p:nvPicPr>
-        <p:blipFill>
-          <a:blip r:embed="rId3">
-            <a:extLst>
-              <a:ext uri="{28A0092B-C50C-407E-A947-70E740481C1C}">
-                <a14:useLocalDpi xmlns:a14="http://schemas.microsoft.com/office/drawing/2010/main" val="0"/>
-              </a:ext>
-            </a:extLst>
-          </a:blip>
-          <a:srcRect/>
-          <a:stretch>
-            <a:fillRect/>
-          </a:stretch>
-        </p:blipFill>
-        <p:spPr bwMode="auto">
-          <a:xfrm>
-            <a:off x="416703" y="2411984"/>
-            <a:ext cx="1028700" cy="695325"/>
-          </a:xfrm>
-          <a:prstGeom prst="rect">
-            <a:avLst/>
-          </a:prstGeom>
-          <a:noFill/>
-          <a:extLst>
-            <a:ext uri="{909E8E84-426E-40DD-AFC4-6F175D3DCCD1}">
-              <a14:hiddenFill xmlns:a14="http://schemas.microsoft.com/office/drawing/2010/main">
-                <a:solidFill>
-                  <a:srgbClr val="FFFFFF"/>
-                </a:solidFill>
-              </a14:hiddenFill>
-            </a:ext>
-          </a:extLst>
-        </p:spPr>
-      </p:pic>
-      <p:sp>
-        <p:nvSpPr>
-          <p:cNvPr id="7" name="ZoneTexte 6">
-            <a:extLst>
-              <a:ext uri="{FF2B5EF4-FFF2-40B4-BE49-F238E27FC236}">
-                <a16:creationId xmlns:a16="http://schemas.microsoft.com/office/drawing/2014/main" id="{0BC7C078-EEF3-4D4E-A3C5-AFD6096F9430}"/>
-              </a:ext>
-            </a:extLst>
-          </p:cNvPr>
-          <p:cNvSpPr txBox="1"/>
-          <p:nvPr/>
-        </p:nvSpPr>
-        <p:spPr>
-          <a:xfrm>
-            <a:off x="1558455" y="2435756"/>
-            <a:ext cx="3819727" cy="1200329"/>
-          </a:xfrm>
-          <a:prstGeom prst="rect">
-            <a:avLst/>
-          </a:prstGeom>
-          <a:noFill/>
-        </p:spPr>
-        <p:txBody>
-          <a:bodyPr wrap="square">
-            <a:spAutoFit/>
-          </a:bodyPr>
-          <a:lstStyle/>
-          <a:p>
-            <a:pPr rtl="0">
-              <a:spcBef>
-                <a:spcPts val="0"/>
-              </a:spcBef>
-              <a:spcAft>
-                <a:spcPts val="0"/>
-              </a:spcAft>
-            </a:pPr>
-            <a:r>
-              <a:rPr lang="fr-FR" sz="1800" b="0" i="0" u="none" strike="noStrike" dirty="0">
-                <a:solidFill>
-                  <a:srgbClr val="000000"/>
-                </a:solidFill>
-                <a:effectLst/>
-                <a:latin typeface="Roboto" panose="02000000000000000000" pitchFamily="2" charset="0"/>
-              </a:rPr>
-              <a:t>m = nombre de méridiens affectés</a:t>
-            </a:r>
-            <a:endParaRPr lang="fr-FR" b="0" dirty="0">
-              <a:effectLst/>
-            </a:endParaRPr>
-          </a:p>
-          <a:p>
-            <a:pPr rtl="0">
-              <a:spcBef>
-                <a:spcPts val="0"/>
-              </a:spcBef>
-              <a:spcAft>
-                <a:spcPts val="0"/>
-              </a:spcAft>
-            </a:pPr>
-            <a:r>
-              <a:rPr lang="fr-FR" sz="1800" b="0" i="0" u="none" strike="noStrike" dirty="0">
-                <a:solidFill>
-                  <a:srgbClr val="000000"/>
-                </a:solidFill>
-                <a:effectLst/>
-                <a:latin typeface="Roboto" panose="02000000000000000000" pitchFamily="2" charset="0"/>
-              </a:rPr>
-              <a:t>n = ordre du polynôme</a:t>
-            </a:r>
-            <a:endParaRPr lang="fr-FR" b="0" dirty="0">
-              <a:effectLst/>
-            </a:endParaRPr>
-          </a:p>
-          <a:p>
-            <a:br>
-              <a:rPr lang="fr-FR" b="0" dirty="0">
-                <a:effectLst/>
-              </a:rPr>
-            </a:br>
-            <a:endParaRPr lang="fr-FR" dirty="0"/>
-          </a:p>
-        </p:txBody>
-      </p:sp>
-      <p:sp>
-        <p:nvSpPr>
-          <p:cNvPr id="5" name="ZoneTexte 4">
-            <a:extLst>
-              <a:ext uri="{FF2B5EF4-FFF2-40B4-BE49-F238E27FC236}">
-                <a16:creationId xmlns:a16="http://schemas.microsoft.com/office/drawing/2014/main" id="{0EBA34AB-5ED1-4361-9EA8-F397EA6CBACA}"/>
-              </a:ext>
-            </a:extLst>
-          </p:cNvPr>
-          <p:cNvSpPr txBox="1"/>
-          <p:nvPr/>
-        </p:nvSpPr>
-        <p:spPr>
-          <a:xfrm>
-            <a:off x="1682279" y="5776017"/>
-            <a:ext cx="1864998" cy="369332"/>
-          </a:xfrm>
-          <a:prstGeom prst="rect">
-            <a:avLst/>
-          </a:prstGeom>
-          <a:noFill/>
-        </p:spPr>
-        <p:txBody>
-          <a:bodyPr wrap="none" rtlCol="0">
-            <a:spAutoFit/>
-          </a:bodyPr>
-          <a:lstStyle/>
-          <a:p>
-            <a:r>
-              <a:rPr lang="fr-FR" dirty="0"/>
-              <a:t>Produit scalaire</a:t>
-            </a:r>
-          </a:p>
-        </p:txBody>
-      </p:sp>
-      <p:sp>
-        <p:nvSpPr>
-          <p:cNvPr id="6" name="ZoneTexte 5">
-            <a:extLst>
-              <a:ext uri="{FF2B5EF4-FFF2-40B4-BE49-F238E27FC236}">
-                <a16:creationId xmlns:a16="http://schemas.microsoft.com/office/drawing/2014/main" id="{A5B0F3C0-2F1E-49CC-8F5C-754D73AF888A}"/>
-              </a:ext>
-            </a:extLst>
-          </p:cNvPr>
-          <p:cNvSpPr txBox="1"/>
-          <p:nvPr/>
-        </p:nvSpPr>
-        <p:spPr>
-          <a:xfrm>
-            <a:off x="3377313" y="1609246"/>
-            <a:ext cx="3196709" cy="461665"/>
-          </a:xfrm>
-          <a:prstGeom prst="rect">
-            <a:avLst/>
-          </a:prstGeom>
-          <a:noFill/>
-        </p:spPr>
-        <p:txBody>
-          <a:bodyPr wrap="none" rtlCol="0">
-            <a:spAutoFit/>
-          </a:bodyPr>
-          <a:lstStyle/>
-          <a:p>
-            <a:r>
-              <a:rPr lang="fr-FR" sz="2400" dirty="0"/>
-              <a:t>Polynômes de Zernike</a:t>
+              <a:t>Projection sur la base des Polynômes de Zernike</a:t>
             </a:r>
           </a:p>
         </p:txBody>
@@ -9196,159 +9176,7 @@
           <p:cNvPr id="4" name="Image 3">
             <a:extLst>
               <a:ext uri="{FF2B5EF4-FFF2-40B4-BE49-F238E27FC236}">
-                <a16:creationId xmlns:a16="http://schemas.microsoft.com/office/drawing/2014/main" id="{6A81A77F-7C9F-4B8F-8918-D844677C238B}"/>
-              </a:ext>
-            </a:extLst>
-          </p:cNvPr>
-          <p:cNvPicPr>
-            <a:picLocks noChangeAspect="1"/>
-          </p:cNvPicPr>
-          <p:nvPr/>
-        </p:nvPicPr>
-        <p:blipFill rotWithShape="1">
-          <a:blip r:embed="rId4">
-            <a:extLst>
-              <a:ext uri="{28A0092B-C50C-407E-A947-70E740481C1C}">
-                <a14:useLocalDpi xmlns:a14="http://schemas.microsoft.com/office/drawing/2010/main" val="0"/>
-              </a:ext>
-            </a:extLst>
-          </a:blip>
-          <a:srcRect l="67836" b="80741"/>
-          <a:stretch/>
-        </p:blipFill>
-        <p:spPr>
-          <a:xfrm>
-            <a:off x="3762560" y="3035920"/>
-            <a:ext cx="2154565" cy="1612659"/>
-          </a:xfrm>
-          <a:prstGeom prst="rect">
-            <a:avLst/>
-          </a:prstGeom>
-        </p:spPr>
-      </p:pic>
-      <p:pic>
-        <p:nvPicPr>
-          <p:cNvPr id="9" name="Image 8">
-            <a:extLst>
-              <a:ext uri="{FF2B5EF4-FFF2-40B4-BE49-F238E27FC236}">
-                <a16:creationId xmlns:a16="http://schemas.microsoft.com/office/drawing/2014/main" id="{87A4BDA3-C183-48E7-98FC-E01F07E3579C}"/>
-              </a:ext>
-            </a:extLst>
-          </p:cNvPr>
-          <p:cNvPicPr>
-            <a:picLocks noChangeAspect="1"/>
-          </p:cNvPicPr>
-          <p:nvPr/>
-        </p:nvPicPr>
-        <p:blipFill rotWithShape="1">
-          <a:blip r:embed="rId4">
-            <a:extLst>
-              <a:ext uri="{28A0092B-C50C-407E-A947-70E740481C1C}">
-                <a14:useLocalDpi xmlns:a14="http://schemas.microsoft.com/office/drawing/2010/main" val="0"/>
-              </a:ext>
-            </a:extLst>
-          </a:blip>
-          <a:srcRect l="34096" r="32279" b="82606"/>
-          <a:stretch/>
-        </p:blipFill>
-        <p:spPr>
-          <a:xfrm>
-            <a:off x="7583134" y="1298672"/>
-            <a:ext cx="2154565" cy="1393159"/>
-          </a:xfrm>
-          <a:prstGeom prst="rect">
-            <a:avLst/>
-          </a:prstGeom>
-        </p:spPr>
-      </p:pic>
-      <p:cxnSp>
-        <p:nvCxnSpPr>
-          <p:cNvPr id="14" name="Connecteur droit avec flèche 13">
-            <a:extLst>
-              <a:ext uri="{FF2B5EF4-FFF2-40B4-BE49-F238E27FC236}">
-                <a16:creationId xmlns:a16="http://schemas.microsoft.com/office/drawing/2014/main" id="{A44D274E-1A26-42B2-B36E-B008DB65F16A}"/>
-              </a:ext>
-            </a:extLst>
-          </p:cNvPr>
-          <p:cNvCxnSpPr>
-            <a:cxnSpLocks/>
-          </p:cNvCxnSpPr>
-          <p:nvPr/>
-        </p:nvCxnSpPr>
-        <p:spPr>
-          <a:xfrm flipH="1">
-            <a:off x="5963055" y="3636085"/>
-            <a:ext cx="379379" cy="0"/>
-          </a:xfrm>
-          <a:prstGeom prst="straightConnector1">
-            <a:avLst/>
-          </a:prstGeom>
-          <a:ln>
-            <a:tailEnd type="triangle"/>
-          </a:ln>
-        </p:spPr>
-        <p:style>
-          <a:lnRef idx="2">
-            <a:schemeClr val="dk1"/>
-          </a:lnRef>
-          <a:fillRef idx="0">
-            <a:schemeClr val="dk1"/>
-          </a:fillRef>
-          <a:effectRef idx="1">
-            <a:schemeClr val="dk1"/>
-          </a:effectRef>
-          <a:fontRef idx="minor">
-            <a:schemeClr val="tx1"/>
-          </a:fontRef>
-        </p:style>
-      </p:cxnSp>
-      <p:cxnSp>
-        <p:nvCxnSpPr>
-          <p:cNvPr id="20" name="Connecteur droit avec flèche 19">
-            <a:extLst>
-              <a:ext uri="{FF2B5EF4-FFF2-40B4-BE49-F238E27FC236}">
-                <a16:creationId xmlns:a16="http://schemas.microsoft.com/office/drawing/2014/main" id="{D9FE2977-00B0-4FE5-9405-7871D3B84C9A}"/>
-              </a:ext>
-            </a:extLst>
-          </p:cNvPr>
-          <p:cNvCxnSpPr>
-            <a:cxnSpLocks/>
-          </p:cNvCxnSpPr>
-          <p:nvPr/>
-        </p:nvCxnSpPr>
-        <p:spPr>
-          <a:xfrm flipV="1">
-            <a:off x="7890498" y="2435756"/>
-            <a:ext cx="601749" cy="685295"/>
-          </a:xfrm>
-          <a:prstGeom prst="straightConnector1">
-            <a:avLst/>
-          </a:prstGeom>
-          <a:ln>
-            <a:tailEnd type="triangle"/>
-          </a:ln>
-        </p:spPr>
-        <p:style>
-          <a:lnRef idx="2">
-            <a:schemeClr val="dk1"/>
-          </a:lnRef>
-          <a:fillRef idx="0">
-            <a:schemeClr val="dk1"/>
-          </a:fillRef>
-          <a:effectRef idx="1">
-            <a:schemeClr val="dk1"/>
-          </a:effectRef>
-          <a:fontRef idx="minor">
-            <a:schemeClr val="tx1"/>
-          </a:fontRef>
-        </p:style>
-      </p:cxnSp>
-      <p:pic>
-        <p:nvPicPr>
-          <p:cNvPr id="24" name="Image 23">
-            <a:extLst>
-              <a:ext uri="{FF2B5EF4-FFF2-40B4-BE49-F238E27FC236}">
-                <a16:creationId xmlns:a16="http://schemas.microsoft.com/office/drawing/2014/main" id="{24AB7E5D-8926-49D8-83A5-8593417460D3}"/>
+                <a16:creationId xmlns:a16="http://schemas.microsoft.com/office/drawing/2014/main" id="{52DF1041-F812-DB5E-7F60-9D990FCEEC37}"/>
               </a:ext>
             </a:extLst>
           </p:cNvPr>
@@ -9358,15 +9186,447 @@
           <p:nvPr/>
         </p:nvPicPr>
         <p:blipFill>
-          <a:blip r:embed="rId5"/>
+          <a:blip r:embed="rId2"/>
           <a:stretch>
             <a:fillRect/>
           </a:stretch>
         </p:blipFill>
         <p:spPr>
           <a:xfrm>
-            <a:off x="1191199" y="4954237"/>
+            <a:off x="677333" y="2544756"/>
             <a:ext cx="2847157" cy="769035"/>
+          </a:xfrm>
+          <a:prstGeom prst="rect">
+            <a:avLst/>
+          </a:prstGeom>
+        </p:spPr>
+      </p:pic>
+      <p:sp>
+        <p:nvSpPr>
+          <p:cNvPr id="5" name="ZoneTexte 4">
+            <a:extLst>
+              <a:ext uri="{FF2B5EF4-FFF2-40B4-BE49-F238E27FC236}">
+                <a16:creationId xmlns:a16="http://schemas.microsoft.com/office/drawing/2014/main" id="{FD0367DB-76C4-DBFF-5015-505FD3A56C85}"/>
+              </a:ext>
+            </a:extLst>
+          </p:cNvPr>
+          <p:cNvSpPr txBox="1"/>
+          <p:nvPr/>
+        </p:nvSpPr>
+        <p:spPr>
+          <a:xfrm>
+            <a:off x="1168413" y="3287103"/>
+            <a:ext cx="1864998" cy="369332"/>
+          </a:xfrm>
+          <a:prstGeom prst="rect">
+            <a:avLst/>
+          </a:prstGeom>
+          <a:noFill/>
+        </p:spPr>
+        <p:txBody>
+          <a:bodyPr wrap="none" rtlCol="0">
+            <a:spAutoFit/>
+          </a:bodyPr>
+          <a:lstStyle/>
+          <a:p>
+            <a:r>
+              <a:rPr lang="fr-FR" dirty="0"/>
+              <a:t>Produit scalaire</a:t>
+            </a:r>
+          </a:p>
+        </p:txBody>
+      </p:sp>
+      <p:sp>
+        <p:nvSpPr>
+          <p:cNvPr id="7" name="ZoneTexte 6">
+            <a:extLst>
+              <a:ext uri="{FF2B5EF4-FFF2-40B4-BE49-F238E27FC236}">
+                <a16:creationId xmlns:a16="http://schemas.microsoft.com/office/drawing/2014/main" id="{1E5779A9-B9BC-6A19-2D0A-C9ADA71B213B}"/>
+              </a:ext>
+            </a:extLst>
+          </p:cNvPr>
+          <p:cNvSpPr txBox="1"/>
+          <p:nvPr/>
+        </p:nvSpPr>
+        <p:spPr>
+          <a:xfrm>
+            <a:off x="6587080" y="2289299"/>
+            <a:ext cx="788156" cy="369332"/>
+          </a:xfrm>
+          <a:prstGeom prst="rect">
+            <a:avLst/>
+          </a:prstGeom>
+          <a:noFill/>
+        </p:spPr>
+        <p:txBody>
+          <a:bodyPr wrap="square" rtlCol="0">
+            <a:spAutoFit/>
+          </a:bodyPr>
+          <a:lstStyle/>
+          <a:p>
+            <a:r>
+              <a:rPr lang="fr-FR" dirty="0"/>
+              <a:t>0,068</a:t>
+            </a:r>
+          </a:p>
+        </p:txBody>
+      </p:sp>
+      <p:sp>
+        <p:nvSpPr>
+          <p:cNvPr id="8" name="ZoneTexte 7">
+            <a:extLst>
+              <a:ext uri="{FF2B5EF4-FFF2-40B4-BE49-F238E27FC236}">
+                <a16:creationId xmlns:a16="http://schemas.microsoft.com/office/drawing/2014/main" id="{ED6C262C-8187-7DB3-80B2-6718401B5791}"/>
+              </a:ext>
+            </a:extLst>
+          </p:cNvPr>
+          <p:cNvSpPr txBox="1"/>
+          <p:nvPr/>
+        </p:nvSpPr>
+        <p:spPr>
+          <a:xfrm>
+            <a:off x="6096000" y="2578235"/>
+            <a:ext cx="1864999" cy="369332"/>
+          </a:xfrm>
+          <a:prstGeom prst="rect">
+            <a:avLst/>
+          </a:prstGeom>
+          <a:noFill/>
+        </p:spPr>
+        <p:txBody>
+          <a:bodyPr wrap="square" rtlCol="0">
+            <a:spAutoFit/>
+          </a:bodyPr>
+          <a:lstStyle/>
+          <a:p>
+            <a:r>
+              <a:rPr lang="fr-FR" dirty="0"/>
+              <a:t>-0,019	-0,008</a:t>
+            </a:r>
+          </a:p>
+        </p:txBody>
+      </p:sp>
+      <p:sp>
+        <p:nvSpPr>
+          <p:cNvPr id="10" name="ZoneTexte 9">
+            <a:extLst>
+              <a:ext uri="{FF2B5EF4-FFF2-40B4-BE49-F238E27FC236}">
+                <a16:creationId xmlns:a16="http://schemas.microsoft.com/office/drawing/2014/main" id="{24F40267-0271-19A2-8991-6E14815B06C3}"/>
+              </a:ext>
+            </a:extLst>
+          </p:cNvPr>
+          <p:cNvSpPr txBox="1"/>
+          <p:nvPr/>
+        </p:nvSpPr>
+        <p:spPr>
+          <a:xfrm>
+            <a:off x="5615660" y="2931888"/>
+            <a:ext cx="2825678" cy="369332"/>
+          </a:xfrm>
+          <a:prstGeom prst="rect">
+            <a:avLst/>
+          </a:prstGeom>
+          <a:noFill/>
+        </p:spPr>
+        <p:txBody>
+          <a:bodyPr wrap="square" rtlCol="0">
+            <a:spAutoFit/>
+          </a:bodyPr>
+          <a:lstStyle/>
+          <a:p>
+            <a:r>
+              <a:rPr lang="fr-FR" dirty="0"/>
+              <a:t>-0,017	0,007	0,0002</a:t>
+            </a:r>
+          </a:p>
+        </p:txBody>
+      </p:sp>
+      <p:sp>
+        <p:nvSpPr>
+          <p:cNvPr id="11" name="ZoneTexte 10">
+            <a:extLst>
+              <a:ext uri="{FF2B5EF4-FFF2-40B4-BE49-F238E27FC236}">
+                <a16:creationId xmlns:a16="http://schemas.microsoft.com/office/drawing/2014/main" id="{F371E552-F9E0-F21D-1535-219FD302E971}"/>
+              </a:ext>
+            </a:extLst>
+          </p:cNvPr>
+          <p:cNvSpPr txBox="1"/>
+          <p:nvPr/>
+        </p:nvSpPr>
+        <p:spPr>
+          <a:xfrm>
+            <a:off x="5063294" y="3301220"/>
+            <a:ext cx="3835728" cy="369332"/>
+          </a:xfrm>
+          <a:prstGeom prst="rect">
+            <a:avLst/>
+          </a:prstGeom>
+          <a:noFill/>
+        </p:spPr>
+        <p:txBody>
+          <a:bodyPr wrap="square" rtlCol="0">
+            <a:spAutoFit/>
+          </a:bodyPr>
+          <a:lstStyle/>
+          <a:p>
+            <a:r>
+              <a:rPr lang="fr-FR" dirty="0"/>
+              <a:t>0,010	-0,023	0,010	-0,014</a:t>
+            </a:r>
+          </a:p>
+        </p:txBody>
+      </p:sp>
+      <p:sp>
+        <p:nvSpPr>
+          <p:cNvPr id="12" name="ZoneTexte 11">
+            <a:extLst>
+              <a:ext uri="{FF2B5EF4-FFF2-40B4-BE49-F238E27FC236}">
+                <a16:creationId xmlns:a16="http://schemas.microsoft.com/office/drawing/2014/main" id="{E764C544-A81E-A8FA-378B-B2D5FA476A6B}"/>
+              </a:ext>
+            </a:extLst>
+          </p:cNvPr>
+          <p:cNvSpPr txBox="1"/>
+          <p:nvPr/>
+        </p:nvSpPr>
+        <p:spPr>
+          <a:xfrm>
+            <a:off x="4711200" y="3660119"/>
+            <a:ext cx="4539916" cy="369332"/>
+          </a:xfrm>
+          <a:prstGeom prst="rect">
+            <a:avLst/>
+          </a:prstGeom>
+          <a:noFill/>
+        </p:spPr>
+        <p:txBody>
+          <a:bodyPr wrap="square" rtlCol="0">
+            <a:spAutoFit/>
+          </a:bodyPr>
+          <a:lstStyle/>
+          <a:p>
+            <a:r>
+              <a:rPr lang="fr-FR" dirty="0"/>
+              <a:t>0,006	-0,048	0,094	0,012	-0,004</a:t>
+            </a:r>
+          </a:p>
+        </p:txBody>
+      </p:sp>
+      <p:sp>
+        <p:nvSpPr>
+          <p:cNvPr id="13" name="ZoneTexte 12">
+            <a:extLst>
+              <a:ext uri="{FF2B5EF4-FFF2-40B4-BE49-F238E27FC236}">
+                <a16:creationId xmlns:a16="http://schemas.microsoft.com/office/drawing/2014/main" id="{7BB321E5-7584-4327-590F-1A37D84033FF}"/>
+              </a:ext>
+            </a:extLst>
+          </p:cNvPr>
+          <p:cNvSpPr txBox="1"/>
+          <p:nvPr/>
+        </p:nvSpPr>
+        <p:spPr>
+          <a:xfrm>
+            <a:off x="4363453" y="4029451"/>
+            <a:ext cx="5325979" cy="369332"/>
+          </a:xfrm>
+          <a:prstGeom prst="rect">
+            <a:avLst/>
+          </a:prstGeom>
+          <a:noFill/>
+        </p:spPr>
+        <p:txBody>
+          <a:bodyPr wrap="square" rtlCol="0">
+            <a:spAutoFit/>
+          </a:bodyPr>
+          <a:lstStyle/>
+          <a:p>
+            <a:r>
+              <a:rPr lang="fr-FR" dirty="0"/>
+              <a:t>0,0006	0,048	-0,117	0,023	-0,051	0,017</a:t>
+            </a:r>
+          </a:p>
+        </p:txBody>
+      </p:sp>
+      <p:sp>
+        <p:nvSpPr>
+          <p:cNvPr id="14" name="Rectangle 13">
+            <a:extLst>
+              <a:ext uri="{FF2B5EF4-FFF2-40B4-BE49-F238E27FC236}">
+                <a16:creationId xmlns:a16="http://schemas.microsoft.com/office/drawing/2014/main" id="{39FA6855-75BF-BB3C-9F17-3AC121C9F865}"/>
+              </a:ext>
+            </a:extLst>
+          </p:cNvPr>
+          <p:cNvSpPr/>
+          <p:nvPr/>
+        </p:nvSpPr>
+        <p:spPr>
+          <a:xfrm>
+            <a:off x="6192079" y="4024205"/>
+            <a:ext cx="834364" cy="364145"/>
+          </a:xfrm>
+          <a:prstGeom prst="rect">
+            <a:avLst/>
+          </a:prstGeom>
+          <a:noFill/>
+          <a:ln w="38100">
+            <a:solidFill>
+              <a:srgbClr val="FF0000"/>
+            </a:solidFill>
+          </a:ln>
+        </p:spPr>
+        <p:style>
+          <a:lnRef idx="2">
+            <a:schemeClr val="accent1">
+              <a:shade val="50000"/>
+            </a:schemeClr>
+          </a:lnRef>
+          <a:fillRef idx="1">
+            <a:schemeClr val="accent1"/>
+          </a:fillRef>
+          <a:effectRef idx="0">
+            <a:schemeClr val="accent1"/>
+          </a:effectRef>
+          <a:fontRef idx="minor">
+            <a:schemeClr val="lt1"/>
+          </a:fontRef>
+        </p:style>
+        <p:txBody>
+          <a:bodyPr rtlCol="0" anchor="ctr"/>
+          <a:lstStyle/>
+          <a:p>
+            <a:pPr algn="ctr"/>
+            <a:endParaRPr lang="fr-FR"/>
+          </a:p>
+        </p:txBody>
+      </p:sp>
+      <p:sp>
+        <p:nvSpPr>
+          <p:cNvPr id="15" name="ZoneTexte 14">
+            <a:extLst>
+              <a:ext uri="{FF2B5EF4-FFF2-40B4-BE49-F238E27FC236}">
+                <a16:creationId xmlns:a16="http://schemas.microsoft.com/office/drawing/2014/main" id="{5AC00C13-FEDB-E752-B145-0F5CA7117E9E}"/>
+              </a:ext>
+            </a:extLst>
+          </p:cNvPr>
+          <p:cNvSpPr txBox="1"/>
+          <p:nvPr/>
+        </p:nvSpPr>
+        <p:spPr>
+          <a:xfrm>
+            <a:off x="694314" y="5020093"/>
+            <a:ext cx="2236305" cy="369332"/>
+          </a:xfrm>
+          <a:prstGeom prst="rect">
+            <a:avLst/>
+          </a:prstGeom>
+          <a:noFill/>
+        </p:spPr>
+        <p:txBody>
+          <a:bodyPr wrap="square" rtlCol="0">
+            <a:spAutoFit/>
+          </a:bodyPr>
+          <a:lstStyle/>
+          <a:p>
+            <a:r>
+              <a:rPr lang="fr-FR" dirty="0"/>
+              <a:t>Grosse influence de </a:t>
+            </a:r>
+          </a:p>
+        </p:txBody>
+      </p:sp>
+      <p:sp>
+        <p:nvSpPr>
+          <p:cNvPr id="18" name="ZoneTexte 17">
+            <a:extLst>
+              <a:ext uri="{FF2B5EF4-FFF2-40B4-BE49-F238E27FC236}">
+                <a16:creationId xmlns:a16="http://schemas.microsoft.com/office/drawing/2014/main" id="{BA1EA8DF-161C-64E8-8196-DA5F147FF5EC}"/>
+              </a:ext>
+            </a:extLst>
+          </p:cNvPr>
+          <p:cNvSpPr txBox="1"/>
+          <p:nvPr/>
+        </p:nvSpPr>
+        <p:spPr>
+          <a:xfrm>
+            <a:off x="3379479" y="5013139"/>
+            <a:ext cx="1967948" cy="369332"/>
+          </a:xfrm>
+          <a:prstGeom prst="rect">
+            <a:avLst/>
+          </a:prstGeom>
+          <a:noFill/>
+        </p:spPr>
+        <p:txBody>
+          <a:bodyPr wrap="square" rtlCol="0">
+            <a:spAutoFit/>
+          </a:bodyPr>
+          <a:lstStyle/>
+          <a:p>
+            <a:r>
+              <a:rPr lang="fr-FR" dirty="0"/>
+              <a:t>sur notre surface</a:t>
+            </a:r>
+          </a:p>
+        </p:txBody>
+      </p:sp>
+      <p:sp>
+        <p:nvSpPr>
+          <p:cNvPr id="19" name="ZoneTexte 18">
+            <a:extLst>
+              <a:ext uri="{FF2B5EF4-FFF2-40B4-BE49-F238E27FC236}">
+                <a16:creationId xmlns:a16="http://schemas.microsoft.com/office/drawing/2014/main" id="{B4AD5A5C-4F7F-A8B2-3509-81B30782BBEB}"/>
+              </a:ext>
+            </a:extLst>
+          </p:cNvPr>
+          <p:cNvSpPr txBox="1"/>
+          <p:nvPr/>
+        </p:nvSpPr>
+        <p:spPr>
+          <a:xfrm>
+            <a:off x="6362735" y="1830979"/>
+            <a:ext cx="1236846" cy="400110"/>
+          </a:xfrm>
+          <a:prstGeom prst="rect">
+            <a:avLst/>
+          </a:prstGeom>
+          <a:noFill/>
+        </p:spPr>
+        <p:txBody>
+          <a:bodyPr wrap="square" rtlCol="0">
+            <a:spAutoFit/>
+          </a:bodyPr>
+          <a:lstStyle/>
+          <a:p>
+            <a:r>
+              <a:rPr lang="fr-FR" sz="2000" dirty="0"/>
+              <a:t>Résultats</a:t>
+            </a:r>
+          </a:p>
+        </p:txBody>
+      </p:sp>
+      <p:pic>
+        <p:nvPicPr>
+          <p:cNvPr id="21" name="Image 20">
+            <a:extLst>
+              <a:ext uri="{FF2B5EF4-FFF2-40B4-BE49-F238E27FC236}">
+                <a16:creationId xmlns:a16="http://schemas.microsoft.com/office/drawing/2014/main" id="{E3A8B4BE-5F39-2D04-B900-3345B38CFABA}"/>
+              </a:ext>
+            </a:extLst>
+          </p:cNvPr>
+          <p:cNvPicPr>
+            <a:picLocks noChangeAspect="1"/>
+          </p:cNvPicPr>
+          <p:nvPr/>
+        </p:nvPicPr>
+        <p:blipFill>
+          <a:blip r:embed="rId3"/>
+          <a:stretch>
+            <a:fillRect/>
+          </a:stretch>
+        </p:blipFill>
+        <p:spPr>
+          <a:xfrm>
+            <a:off x="2879798" y="5043492"/>
+            <a:ext cx="499681" cy="345933"/>
           </a:xfrm>
           <a:prstGeom prst="rect">
             <a:avLst/>
@@ -9376,7 +9636,7 @@
     </p:spTree>
     <p:extLst>
       <p:ext uri="{BB962C8B-B14F-4D97-AF65-F5344CB8AC3E}">
-        <p14:creationId xmlns:p14="http://schemas.microsoft.com/office/powerpoint/2010/main" val="2600506359"/>
+        <p14:creationId xmlns:p14="http://schemas.microsoft.com/office/powerpoint/2010/main" val="2060116456"/>
       </p:ext>
     </p:extLst>
   </p:cSld>
@@ -9408,7 +9668,7 @@
           <p:cNvPr id="2" name="Titre 1">
             <a:extLst>
               <a:ext uri="{FF2B5EF4-FFF2-40B4-BE49-F238E27FC236}">
-                <a16:creationId xmlns:a16="http://schemas.microsoft.com/office/drawing/2014/main" id="{2327E90D-33B7-2CED-F37A-3AA68301A1EC}"/>
+                <a16:creationId xmlns:a16="http://schemas.microsoft.com/office/drawing/2014/main" id="{33684F79-C0DF-50B2-D0EF-1DF0FA6191BC}"/>
               </a:ext>
             </a:extLst>
           </p:cNvPr>
@@ -9426,7 +9686,7 @@
           <a:p>
             <a:r>
               <a:rPr lang="fr-FR" dirty="0"/>
-              <a:t>Projection sur la base des Polynômes de Zernike</a:t>
+              <a:t>Conclusion</a:t>
             </a:r>
           </a:p>
         </p:txBody>
@@ -9436,7 +9696,7 @@
           <p:cNvPr id="3" name="Espace réservé du contenu 2">
             <a:extLst>
               <a:ext uri="{FF2B5EF4-FFF2-40B4-BE49-F238E27FC236}">
-                <a16:creationId xmlns:a16="http://schemas.microsoft.com/office/drawing/2014/main" id="{B9DDA332-0EF3-5488-C992-40C81F8156DC}"/>
+                <a16:creationId xmlns:a16="http://schemas.microsoft.com/office/drawing/2014/main" id="{91EC75FF-1612-0F42-F9BD-82EBB30CDA0E}"/>
               </a:ext>
             </a:extLst>
           </p:cNvPr>
@@ -9452,14 +9712,29 @@
           <a:bodyPr/>
           <a:lstStyle/>
           <a:p>
-            <a:endParaRPr lang="fr-FR" dirty="0"/>
+            <a:pPr marL="0" indent="0">
+              <a:buNone/>
+            </a:pPr>
+            <a:r>
+              <a:rPr lang="fr-FR" dirty="0"/>
+              <a:t>On voit ainsi que, bien qu’étant minimes, les inhomogénéités et les déformations mécaniques ont une importance dans le stigmatisme d’un système optique. Ainsi, après les avoir mesurés il faudra parvenir à une méthode pour les corriger, ou les compenser. </a:t>
+            </a:r>
+          </a:p>
+          <a:p>
+            <a:pPr marL="0" indent="0">
+              <a:buNone/>
+            </a:pPr>
+            <a:r>
+              <a:rPr lang="fr-FR" dirty="0"/>
+              <a:t>C’est dans ce but notamment que l’optique adaptative existe.</a:t>
+            </a:r>
           </a:p>
         </p:txBody>
       </p:sp>
     </p:spTree>
     <p:extLst>
       <p:ext uri="{BB962C8B-B14F-4D97-AF65-F5344CB8AC3E}">
-        <p14:creationId xmlns:p14="http://schemas.microsoft.com/office/powerpoint/2010/main" val="2060116456"/>
+        <p14:creationId xmlns:p14="http://schemas.microsoft.com/office/powerpoint/2010/main" val="3746643569"/>
       </p:ext>
     </p:extLst>
   </p:cSld>
@@ -9558,89 +9833,6 @@
 </p:sld>
 </file>
 
-<file path=ppt/slides/slide20.xml><?xml version="1.0" encoding="utf-8"?>
-<p:sld xmlns:a="http://schemas.openxmlformats.org/drawingml/2006/main" xmlns:r="http://schemas.openxmlformats.org/officeDocument/2006/relationships" xmlns:p="http://schemas.openxmlformats.org/presentationml/2006/main">
-  <p:cSld>
-    <p:spTree>
-      <p:nvGrpSpPr>
-        <p:cNvPr id="1" name=""/>
-        <p:cNvGrpSpPr/>
-        <p:nvPr/>
-      </p:nvGrpSpPr>
-      <p:grpSpPr>
-        <a:xfrm>
-          <a:off x="0" y="0"/>
-          <a:ext cx="0" cy="0"/>
-          <a:chOff x="0" y="0"/>
-          <a:chExt cx="0" cy="0"/>
-        </a:xfrm>
-      </p:grpSpPr>
-      <p:sp>
-        <p:nvSpPr>
-          <p:cNvPr id="2" name="Titre 1">
-            <a:extLst>
-              <a:ext uri="{FF2B5EF4-FFF2-40B4-BE49-F238E27FC236}">
-                <a16:creationId xmlns:a16="http://schemas.microsoft.com/office/drawing/2014/main" id="{33684F79-C0DF-50B2-D0EF-1DF0FA6191BC}"/>
-              </a:ext>
-            </a:extLst>
-          </p:cNvPr>
-          <p:cNvSpPr>
-            <a:spLocks noGrp="1"/>
-          </p:cNvSpPr>
-          <p:nvPr>
-            <p:ph type="title"/>
-          </p:nvPr>
-        </p:nvSpPr>
-        <p:spPr/>
-        <p:txBody>
-          <a:bodyPr/>
-          <a:lstStyle/>
-          <a:p>
-            <a:r>
-              <a:rPr lang="fr-FR" dirty="0"/>
-              <a:t>Conclusion</a:t>
-            </a:r>
-          </a:p>
-        </p:txBody>
-      </p:sp>
-      <p:sp>
-        <p:nvSpPr>
-          <p:cNvPr id="3" name="Espace réservé du contenu 2">
-            <a:extLst>
-              <a:ext uri="{FF2B5EF4-FFF2-40B4-BE49-F238E27FC236}">
-                <a16:creationId xmlns:a16="http://schemas.microsoft.com/office/drawing/2014/main" id="{91EC75FF-1612-0F42-F9BD-82EBB30CDA0E}"/>
-              </a:ext>
-            </a:extLst>
-          </p:cNvPr>
-          <p:cNvSpPr>
-            <a:spLocks noGrp="1"/>
-          </p:cNvSpPr>
-          <p:nvPr>
-            <p:ph idx="1"/>
-          </p:nvPr>
-        </p:nvSpPr>
-        <p:spPr/>
-        <p:txBody>
-          <a:bodyPr/>
-          <a:lstStyle/>
-          <a:p>
-            <a:endParaRPr lang="fr-FR"/>
-          </a:p>
-        </p:txBody>
-      </p:sp>
-    </p:spTree>
-    <p:extLst>
-      <p:ext uri="{BB962C8B-B14F-4D97-AF65-F5344CB8AC3E}">
-        <p14:creationId xmlns:p14="http://schemas.microsoft.com/office/powerpoint/2010/main" val="3746643569"/>
-      </p:ext>
-    </p:extLst>
-  </p:cSld>
-  <p:clrMapOvr>
-    <a:masterClrMapping/>
-  </p:clrMapOvr>
-</p:sld>
-</file>
-
 <file path=ppt/slides/slide3.xml><?xml version="1.0" encoding="utf-8"?>
 <p:sld xmlns:a="http://schemas.openxmlformats.org/drawingml/2006/main" xmlns:r="http://schemas.openxmlformats.org/officeDocument/2006/relationships" xmlns:p="http://schemas.openxmlformats.org/presentationml/2006/main">
   <p:cSld>
@@ -9769,23 +9961,7 @@
                   <a:schemeClr val="tx1"/>
                 </a:solidFill>
               </a:rPr>
-              <a:t>Mesure de la déformation d’un front d’onde type </a:t>
-            </a:r>
-            <a:r>
-              <a:rPr lang="fr-FR" sz="2400" dirty="0" err="1">
-                <a:solidFill>
-                  <a:schemeClr val="tx1"/>
-                </a:solidFill>
-              </a:rPr>
-              <a:t>Shack</a:t>
-            </a:r>
-            <a:r>
-              <a:rPr lang="fr-FR" sz="2400" dirty="0">
-                <a:solidFill>
-                  <a:schemeClr val="tx1"/>
-                </a:solidFill>
-              </a:rPr>
-              <a:t>-Hartmann</a:t>
+              <a:t>Mesure de la déformation d’un front d’onde type Shack-Hartmann</a:t>
             </a:r>
           </a:p>
           <a:p>
@@ -10036,47 +10212,7 @@
           <a:p>
             <a:r>
               <a:rPr lang="fr-FR" dirty="0"/>
-              <a:t>Présentation générale</a:t>
-            </a:r>
-          </a:p>
-        </p:txBody>
-      </p:sp>
-      <p:sp>
-        <p:nvSpPr>
-          <p:cNvPr id="3" name="Espace réservé du contenu 2">
-            <a:extLst>
-              <a:ext uri="{FF2B5EF4-FFF2-40B4-BE49-F238E27FC236}">
-                <a16:creationId xmlns:a16="http://schemas.microsoft.com/office/drawing/2014/main" id="{9FCD0717-C9AA-C4BE-D4F8-6286868FAF5B}"/>
-              </a:ext>
-            </a:extLst>
-          </p:cNvPr>
-          <p:cNvSpPr>
-            <a:spLocks noGrp="1"/>
-          </p:cNvSpPr>
-          <p:nvPr>
-            <p:ph idx="1"/>
-          </p:nvPr>
-        </p:nvSpPr>
-        <p:spPr/>
-        <p:txBody>
-          <a:bodyPr/>
-          <a:lstStyle/>
-          <a:p>
-            <a:pPr marL="0" indent="0">
-              <a:buNone/>
-            </a:pPr>
-            <a:r>
-              <a:rPr lang="fr-FR" dirty="0"/>
-              <a:t>LASER</a:t>
-            </a:r>
-          </a:p>
-          <a:p>
-            <a:pPr marL="0" indent="0">
-              <a:buNone/>
-            </a:pPr>
-            <a:r>
-              <a:rPr lang="fr-FR" dirty="0"/>
-              <a:t>+ inhomogénéités</a:t>
+              <a:t>0) - 1. Présentation générale</a:t>
             </a:r>
           </a:p>
         </p:txBody>
@@ -10109,8 +10245,8 @@
         </p:blipFill>
         <p:spPr bwMode="auto">
           <a:xfrm>
-            <a:off x="6096000" y="2372550"/>
-            <a:ext cx="3177292" cy="2112900"/>
+            <a:off x="2760898" y="2582342"/>
+            <a:ext cx="4429539" cy="2945645"/>
           </a:xfrm>
           <a:prstGeom prst="rect">
             <a:avLst/>
@@ -10127,6 +10263,41 @@
           </a:extLst>
         </p:spPr>
       </p:pic>
+      <p:sp>
+        <p:nvSpPr>
+          <p:cNvPr id="5" name="ZoneTexte 4">
+            <a:extLst>
+              <a:ext uri="{FF2B5EF4-FFF2-40B4-BE49-F238E27FC236}">
+                <a16:creationId xmlns:a16="http://schemas.microsoft.com/office/drawing/2014/main" id="{9FE1066F-CD93-709C-08C0-EF8CF79FEF32}"/>
+              </a:ext>
+            </a:extLst>
+          </p:cNvPr>
+          <p:cNvSpPr txBox="1"/>
+          <p:nvPr/>
+        </p:nvSpPr>
+        <p:spPr>
+          <a:xfrm>
+            <a:off x="4553254" y="1745734"/>
+            <a:ext cx="953024" cy="461665"/>
+          </a:xfrm>
+          <a:prstGeom prst="rect">
+            <a:avLst/>
+          </a:prstGeom>
+          <a:noFill/>
+        </p:spPr>
+        <p:txBody>
+          <a:bodyPr wrap="square" rtlCol="0">
+            <a:spAutoFit/>
+          </a:bodyPr>
+          <a:lstStyle/>
+          <a:p>
+            <a:r>
+              <a:rPr lang="fr-FR" sz="2400" dirty="0"/>
+              <a:t>L’œil</a:t>
+            </a:r>
+          </a:p>
+        </p:txBody>
+      </p:sp>
     </p:spTree>
     <p:extLst>
       <p:ext uri="{BB962C8B-B14F-4D97-AF65-F5344CB8AC3E}">
@@ -10180,13 +10351,8 @@
           <a:p>
             <a:r>
               <a:rPr lang="fr-FR" dirty="0"/>
-              <a:t>Différents défauts de l’</a:t>
-            </a:r>
-            <a:r>
-              <a:rPr lang="fr-FR" dirty="0" err="1"/>
-              <a:t>oeil</a:t>
-            </a:r>
-            <a:endParaRPr lang="fr-FR" dirty="0"/>
+              <a:t>0) – 2. Différents défauts de l’œil</a:t>
+            </a:r>
           </a:p>
         </p:txBody>
       </p:sp>
@@ -10447,7 +10613,7 @@
         <p:spPr>
           <a:xfrm>
             <a:off x="589723" y="427382"/>
-            <a:ext cx="4449416" cy="593894"/>
+            <a:ext cx="5890590" cy="593894"/>
           </a:xfrm>
         </p:spPr>
         <p:txBody>
@@ -10463,13 +10629,8 @@
             </a:pPr>
             <a:r>
               <a:rPr lang="fr-FR" sz="3800" dirty="0"/>
-              <a:t>Modélisation de l’</a:t>
-            </a:r>
-            <a:r>
-              <a:rPr lang="fr-FR" sz="3800" dirty="0" err="1"/>
-              <a:t>oeil</a:t>
-            </a:r>
-            <a:endParaRPr lang="fr-FR" sz="3800" dirty="0"/>
+              <a:t>0) – 3. Modélisation de l’œil</a:t>
+            </a:r>
           </a:p>
         </p:txBody>
       </p:sp>
@@ -11314,7 +11475,7 @@
           <p:cNvPr id="2" name="Titre 1">
             <a:extLst>
               <a:ext uri="{FF2B5EF4-FFF2-40B4-BE49-F238E27FC236}">
-                <a16:creationId xmlns:a16="http://schemas.microsoft.com/office/drawing/2014/main" id="{4AFAD043-689D-7673-B08C-06561E66E545}"/>
+                <a16:creationId xmlns:a16="http://schemas.microsoft.com/office/drawing/2014/main" id="{5D32D587-59D9-45B8-AE5B-0EAB1F4BFC6F}"/>
               </a:ext>
             </a:extLst>
           </p:cNvPr>
@@ -11327,19 +11488,322 @@
         </p:nvSpPr>
         <p:spPr/>
         <p:txBody>
-          <a:bodyPr/>
-          <a:lstStyle/>
-          <a:p>
-            <a:endParaRPr lang="fr-FR"/>
-          </a:p>
-        </p:txBody>
-      </p:sp>
-      <p:sp>
-        <p:nvSpPr>
-          <p:cNvPr id="3" name="Espace réservé du contenu 2">
+          <a:bodyPr>
+            <a:normAutofit fontScale="90000"/>
+          </a:bodyPr>
+          <a:lstStyle/>
+          <a:p>
+            <a:r>
+              <a:rPr lang="fr-FR" dirty="0"/>
+              <a:t>Seconde manipulation : milieu hétérogène:</a:t>
+            </a:r>
+            <a:br>
+              <a:rPr lang="fr-FR" dirty="0"/>
+            </a:br>
+            <a:r>
+              <a:rPr lang="fr-FR" sz="2400" dirty="0"/>
+              <a:t>Solution concentrée en sucre</a:t>
+            </a:r>
+            <a:endParaRPr lang="fr-FR" dirty="0"/>
+          </a:p>
+        </p:txBody>
+      </p:sp>
+      <p:pic>
+        <p:nvPicPr>
+          <p:cNvPr id="3074" name="Picture 2">
             <a:extLst>
               <a:ext uri="{FF2B5EF4-FFF2-40B4-BE49-F238E27FC236}">
-                <a16:creationId xmlns:a16="http://schemas.microsoft.com/office/drawing/2014/main" id="{ED6C1C03-E671-97D0-1BE0-975F9808D68E}"/>
+                <a16:creationId xmlns:a16="http://schemas.microsoft.com/office/drawing/2014/main" id="{D1623D1A-0268-4EEB-AA19-CA60583C242F}"/>
+              </a:ext>
+            </a:extLst>
+          </p:cNvPr>
+          <p:cNvPicPr>
+            <a:picLocks noChangeAspect="1" noChangeArrowheads="1"/>
+          </p:cNvPicPr>
+          <p:nvPr/>
+        </p:nvPicPr>
+        <p:blipFill>
+          <a:blip r:embed="rId2">
+            <a:extLst>
+              <a:ext uri="{28A0092B-C50C-407E-A947-70E740481C1C}">
+                <a14:useLocalDpi xmlns:a14="http://schemas.microsoft.com/office/drawing/2010/main" val="0"/>
+              </a:ext>
+            </a:extLst>
+          </a:blip>
+          <a:srcRect/>
+          <a:stretch>
+            <a:fillRect/>
+          </a:stretch>
+        </p:blipFill>
+        <p:spPr bwMode="auto">
+          <a:xfrm>
+            <a:off x="512826" y="2694432"/>
+            <a:ext cx="2505456" cy="3340608"/>
+          </a:xfrm>
+          <a:prstGeom prst="rect">
+            <a:avLst/>
+          </a:prstGeom>
+          <a:noFill/>
+          <a:extLst>
+            <a:ext uri="{909E8E84-426E-40DD-AFC4-6F175D3DCCD1}">
+              <a14:hiddenFill xmlns:a14="http://schemas.microsoft.com/office/drawing/2010/main">
+                <a:solidFill>
+                  <a:srgbClr val="FFFFFF"/>
+                </a:solidFill>
+              </a14:hiddenFill>
+            </a:ext>
+          </a:extLst>
+        </p:spPr>
+      </p:pic>
+      <p:pic>
+        <p:nvPicPr>
+          <p:cNvPr id="3076" name="Picture 4">
+            <a:extLst>
+              <a:ext uri="{FF2B5EF4-FFF2-40B4-BE49-F238E27FC236}">
+                <a16:creationId xmlns:a16="http://schemas.microsoft.com/office/drawing/2014/main" id="{1CE92ADD-D75F-4E36-A725-0C05475BDC8F}"/>
+              </a:ext>
+            </a:extLst>
+          </p:cNvPr>
+          <p:cNvPicPr>
+            <a:picLocks noChangeAspect="1" noChangeArrowheads="1"/>
+          </p:cNvPicPr>
+          <p:nvPr/>
+        </p:nvPicPr>
+        <p:blipFill>
+          <a:blip r:embed="rId3">
+            <a:extLst>
+              <a:ext uri="{28A0092B-C50C-407E-A947-70E740481C1C}">
+                <a14:useLocalDpi xmlns:a14="http://schemas.microsoft.com/office/drawing/2010/main" val="0"/>
+              </a:ext>
+            </a:extLst>
+          </a:blip>
+          <a:srcRect/>
+          <a:stretch>
+            <a:fillRect/>
+          </a:stretch>
+        </p:blipFill>
+        <p:spPr bwMode="auto">
+          <a:xfrm>
+            <a:off x="3430524" y="2694432"/>
+            <a:ext cx="2505456" cy="3340608"/>
+          </a:xfrm>
+          <a:prstGeom prst="rect">
+            <a:avLst/>
+          </a:prstGeom>
+          <a:noFill/>
+          <a:extLst>
+            <a:ext uri="{909E8E84-426E-40DD-AFC4-6F175D3DCCD1}">
+              <a14:hiddenFill xmlns:a14="http://schemas.microsoft.com/office/drawing/2010/main">
+                <a:solidFill>
+                  <a:srgbClr val="FFFFFF"/>
+                </a:solidFill>
+              </a14:hiddenFill>
+            </a:ext>
+          </a:extLst>
+        </p:spPr>
+      </p:pic>
+      <p:pic>
+        <p:nvPicPr>
+          <p:cNvPr id="3078" name="Picture 6">
+            <a:extLst>
+              <a:ext uri="{FF2B5EF4-FFF2-40B4-BE49-F238E27FC236}">
+                <a16:creationId xmlns:a16="http://schemas.microsoft.com/office/drawing/2014/main" id="{5B661197-AD99-4B66-9204-BDA0B68E6C26}"/>
+              </a:ext>
+            </a:extLst>
+          </p:cNvPr>
+          <p:cNvPicPr>
+            <a:picLocks noChangeAspect="1" noChangeArrowheads="1"/>
+          </p:cNvPicPr>
+          <p:nvPr/>
+        </p:nvPicPr>
+        <p:blipFill>
+          <a:blip r:embed="rId4">
+            <a:extLst>
+              <a:ext uri="{28A0092B-C50C-407E-A947-70E740481C1C}">
+                <a14:useLocalDpi xmlns:a14="http://schemas.microsoft.com/office/drawing/2010/main" val="0"/>
+              </a:ext>
+            </a:extLst>
+          </a:blip>
+          <a:srcRect/>
+          <a:stretch>
+            <a:fillRect/>
+          </a:stretch>
+        </p:blipFill>
+        <p:spPr bwMode="auto">
+          <a:xfrm>
+            <a:off x="6348222" y="2694432"/>
+            <a:ext cx="2505456" cy="3340608"/>
+          </a:xfrm>
+          <a:prstGeom prst="rect">
+            <a:avLst/>
+          </a:prstGeom>
+          <a:noFill/>
+          <a:extLst>
+            <a:ext uri="{909E8E84-426E-40DD-AFC4-6F175D3DCCD1}">
+              <a14:hiddenFill xmlns:a14="http://schemas.microsoft.com/office/drawing/2010/main">
+                <a:solidFill>
+                  <a:srgbClr val="FFFFFF"/>
+                </a:solidFill>
+              </a14:hiddenFill>
+            </a:ext>
+          </a:extLst>
+        </p:spPr>
+      </p:pic>
+      <p:cxnSp>
+        <p:nvCxnSpPr>
+          <p:cNvPr id="7" name="Connecteur droit avec flèche 6">
+            <a:extLst>
+              <a:ext uri="{FF2B5EF4-FFF2-40B4-BE49-F238E27FC236}">
+                <a16:creationId xmlns:a16="http://schemas.microsoft.com/office/drawing/2014/main" id="{5771B76C-5C94-4031-B78F-8C7095217ACB}"/>
+              </a:ext>
+            </a:extLst>
+          </p:cNvPr>
+          <p:cNvCxnSpPr>
+            <a:cxnSpLocks/>
+          </p:cNvCxnSpPr>
+          <p:nvPr/>
+        </p:nvCxnSpPr>
+        <p:spPr>
+          <a:xfrm>
+            <a:off x="382555" y="6410131"/>
+            <a:ext cx="8471123" cy="0"/>
+          </a:xfrm>
+          <a:prstGeom prst="straightConnector1">
+            <a:avLst/>
+          </a:prstGeom>
+          <a:ln>
+            <a:tailEnd type="triangle"/>
+          </a:ln>
+        </p:spPr>
+        <p:style>
+          <a:lnRef idx="2">
+            <a:schemeClr val="dk1"/>
+          </a:lnRef>
+          <a:fillRef idx="0">
+            <a:schemeClr val="dk1"/>
+          </a:fillRef>
+          <a:effectRef idx="1">
+            <a:schemeClr val="dk1"/>
+          </a:effectRef>
+          <a:fontRef idx="minor">
+            <a:schemeClr val="tx1"/>
+          </a:fontRef>
+        </p:style>
+      </p:cxnSp>
+      <p:sp>
+        <p:nvSpPr>
+          <p:cNvPr id="9" name="ZoneTexte 8">
+            <a:extLst>
+              <a:ext uri="{FF2B5EF4-FFF2-40B4-BE49-F238E27FC236}">
+                <a16:creationId xmlns:a16="http://schemas.microsoft.com/office/drawing/2014/main" id="{983103B1-0E54-4C6B-B269-FB08063BF2FC}"/>
+              </a:ext>
+            </a:extLst>
+          </p:cNvPr>
+          <p:cNvSpPr txBox="1"/>
+          <p:nvPr/>
+        </p:nvSpPr>
+        <p:spPr>
+          <a:xfrm>
+            <a:off x="8853678" y="6035040"/>
+            <a:ext cx="276038" cy="369332"/>
+          </a:xfrm>
+          <a:prstGeom prst="rect">
+            <a:avLst/>
+          </a:prstGeom>
+          <a:noFill/>
+        </p:spPr>
+        <p:txBody>
+          <a:bodyPr wrap="none" rtlCol="0">
+            <a:spAutoFit/>
+          </a:bodyPr>
+          <a:lstStyle/>
+          <a:p>
+            <a:r>
+              <a:rPr lang="fr-FR" dirty="0"/>
+              <a:t>t</a:t>
+            </a:r>
+          </a:p>
+        </p:txBody>
+      </p:sp>
+      <p:cxnSp>
+        <p:nvCxnSpPr>
+          <p:cNvPr id="12" name="Connecteur droit 11">
+            <a:extLst>
+              <a:ext uri="{FF2B5EF4-FFF2-40B4-BE49-F238E27FC236}">
+                <a16:creationId xmlns:a16="http://schemas.microsoft.com/office/drawing/2014/main" id="{79F07BE6-B121-4D88-A26B-3DB51FFBD76E}"/>
+              </a:ext>
+            </a:extLst>
+          </p:cNvPr>
+          <p:cNvCxnSpPr>
+            <a:cxnSpLocks/>
+          </p:cNvCxnSpPr>
+          <p:nvPr/>
+        </p:nvCxnSpPr>
+        <p:spPr>
+          <a:xfrm>
+            <a:off x="512826" y="6316824"/>
+            <a:ext cx="0" cy="205274"/>
+          </a:xfrm>
+          <a:prstGeom prst="line">
+            <a:avLst/>
+          </a:prstGeom>
+        </p:spPr>
+        <p:style>
+          <a:lnRef idx="2">
+            <a:schemeClr val="dk1"/>
+          </a:lnRef>
+          <a:fillRef idx="0">
+            <a:schemeClr val="dk1"/>
+          </a:fillRef>
+          <a:effectRef idx="1">
+            <a:schemeClr val="dk1"/>
+          </a:effectRef>
+          <a:fontRef idx="minor">
+            <a:schemeClr val="tx1"/>
+          </a:fontRef>
+        </p:style>
+      </p:cxnSp>
+      <p:sp>
+        <p:nvSpPr>
+          <p:cNvPr id="18" name="ZoneTexte 17">
+            <a:extLst>
+              <a:ext uri="{FF2B5EF4-FFF2-40B4-BE49-F238E27FC236}">
+                <a16:creationId xmlns:a16="http://schemas.microsoft.com/office/drawing/2014/main" id="{EA98AE88-C38B-4F49-AD10-2B6F780767C8}"/>
+              </a:ext>
+            </a:extLst>
+          </p:cNvPr>
+          <p:cNvSpPr txBox="1"/>
+          <p:nvPr/>
+        </p:nvSpPr>
+        <p:spPr>
+          <a:xfrm>
+            <a:off x="512826" y="6430739"/>
+            <a:ext cx="306494" cy="369332"/>
+          </a:xfrm>
+          <a:prstGeom prst="rect">
+            <a:avLst/>
+          </a:prstGeom>
+          <a:noFill/>
+        </p:spPr>
+        <p:txBody>
+          <a:bodyPr wrap="none" rtlCol="0">
+            <a:spAutoFit/>
+          </a:bodyPr>
+          <a:lstStyle/>
+          <a:p>
+            <a:r>
+              <a:rPr lang="fr-FR" dirty="0"/>
+              <a:t>0</a:t>
+            </a:r>
+          </a:p>
+        </p:txBody>
+      </p:sp>
+      <p:sp>
+        <p:nvSpPr>
+          <p:cNvPr id="10" name="Espace réservé du contenu 2">
+            <a:extLst>
+              <a:ext uri="{FF2B5EF4-FFF2-40B4-BE49-F238E27FC236}">
+                <a16:creationId xmlns:a16="http://schemas.microsoft.com/office/drawing/2014/main" id="{E81E16B7-CC43-A1BB-EC49-0F3E1E56A6CB}"/>
               </a:ext>
             </a:extLst>
           </p:cNvPr>
@@ -11350,14 +11814,44 @@
             <p:ph idx="1"/>
           </p:nvPr>
         </p:nvSpPr>
-        <p:spPr/>
-        <p:txBody>
-          <a:bodyPr/>
-          <a:lstStyle/>
-          <a:p>
+        <p:spPr>
+          <a:xfrm>
+            <a:off x="4837485" y="1542413"/>
+            <a:ext cx="4292231" cy="1149140"/>
+          </a:xfrm>
+        </p:spPr>
+        <p:txBody>
+          <a:bodyPr>
+            <a:normAutofit lnSpcReduction="10000"/>
+          </a:bodyPr>
+          <a:lstStyle/>
+          <a:p>
+            <a:pPr marL="0" indent="0">
+              <a:buNone/>
+            </a:pPr>
             <a:r>
               <a:rPr lang="fr-FR" dirty="0"/>
-              <a:t>Diffraction +temps de parcours : on s’intéresse qu’au temps de parcours</a:t>
+              <a:t>Deux phénomènes entrent en jeu ici :</a:t>
+            </a:r>
+          </a:p>
+          <a:p>
+            <a:pPr>
+              <a:buFontTx/>
+              <a:buChar char="-"/>
+            </a:pPr>
+            <a:r>
+              <a:rPr lang="fr-FR" dirty="0"/>
+              <a:t>La réfraction</a:t>
+            </a:r>
+          </a:p>
+          <a:p>
+            <a:pPr>
+              <a:buFontTx/>
+              <a:buChar char="-"/>
+            </a:pPr>
+            <a:r>
+              <a:rPr lang="fr-FR" dirty="0"/>
+              <a:t>La différence de temps de parcours</a:t>
             </a:r>
           </a:p>
         </p:txBody>
@@ -11365,7 +11859,7 @@
     </p:spTree>
     <p:extLst>
       <p:ext uri="{BB962C8B-B14F-4D97-AF65-F5344CB8AC3E}">
-        <p14:creationId xmlns:p14="http://schemas.microsoft.com/office/powerpoint/2010/main" val="963598780"/>
+        <p14:creationId xmlns:p14="http://schemas.microsoft.com/office/powerpoint/2010/main" val="1766247252"/>
       </p:ext>
     </p:extLst>
   </p:cSld>

</xml_diff>